<commit_message>
Actualización estable: conexión con Gemini funcionando, URL de ngrok automatizada
</commit_message>
<xml_diff>
--- a/Others/Aiventura MFC.pptx
+++ b/Others/Aiventura MFC.pptx
@@ -4391,7 +4391,7 @@
         <p:spPr>
           <a:xfrm>
             <a:off x="207108" y="3054670"/>
-            <a:ext cx="5630061" cy="2523768"/>
+            <a:ext cx="5630061" cy="2800767"/>
           </a:xfrm>
           <a:prstGeom prst="rect">
             <a:avLst/>
@@ -4586,6 +4586,25 @@
               <a:rPr lang="es-MX" sz="1400" dirty="0"/>
               <a:t>(elimina ramas remotas ya no existentes)</a:t>
             </a:r>
+          </a:p>
+          <a:p>
+            <a:r>
+              <a:rPr lang="en-US" dirty="0"/>
+              <a:t>git checkout -b feature/</a:t>
+            </a:r>
+            <a:r>
+              <a:rPr lang="es-MX" sz="1400" dirty="0" err="1"/>
+              <a:t>nombre_rama</a:t>
+            </a:r>
+            <a:r>
+              <a:rPr lang="es-MX" sz="1400" dirty="0"/>
+              <a:t> (crea una </a:t>
+            </a:r>
+            <a:r>
+              <a:rPr lang="es-MX" sz="1400"/>
+              <a:t>rama nueva)</a:t>
+            </a:r>
+            <a:endParaRPr lang="es-MX" sz="1400" dirty="0"/>
           </a:p>
           <a:p>
             <a:endParaRPr lang="es-MX" dirty="0"/>

</xml_diff>

<commit_message>
Nuevos cambios 15mayo - Ya funciona la generacion de cuento hasta antes de imagen y pdf
</commit_message>
<xml_diff>
--- a/Others/Aiventura MFC.pptx
+++ b/Others/Aiventura MFC.pptx
@@ -10,45 +10,44 @@
     <p:sldId id="258" r:id="rId4"/>
     <p:sldId id="259" r:id="rId5"/>
     <p:sldId id="260" r:id="rId6"/>
-    <p:sldId id="261" r:id="rId7"/>
-    <p:sldId id="262" r:id="rId8"/>
-    <p:sldId id="263" r:id="rId9"/>
-    <p:sldId id="264" r:id="rId10"/>
-    <p:sldId id="265" r:id="rId11"/>
-    <p:sldId id="266" r:id="rId12"/>
-    <p:sldId id="267" r:id="rId13"/>
-    <p:sldId id="268" r:id="rId14"/>
-    <p:sldId id="269" r:id="rId15"/>
-    <p:sldId id="270" r:id="rId16"/>
-    <p:sldId id="271" r:id="rId17"/>
-    <p:sldId id="272" r:id="rId18"/>
-    <p:sldId id="273" r:id="rId19"/>
-    <p:sldId id="274" r:id="rId20"/>
-    <p:sldId id="275" r:id="rId21"/>
-    <p:sldId id="276" r:id="rId22"/>
-    <p:sldId id="277" r:id="rId23"/>
-    <p:sldId id="278" r:id="rId24"/>
-    <p:sldId id="279" r:id="rId25"/>
-    <p:sldId id="280" r:id="rId26"/>
-    <p:sldId id="281" r:id="rId27"/>
-    <p:sldId id="282" r:id="rId28"/>
-    <p:sldId id="283" r:id="rId29"/>
-    <p:sldId id="284" r:id="rId30"/>
-    <p:sldId id="285" r:id="rId31"/>
-    <p:sldId id="286" r:id="rId32"/>
-    <p:sldId id="287" r:id="rId33"/>
-    <p:sldId id="288" r:id="rId34"/>
-    <p:sldId id="289" r:id="rId35"/>
-    <p:sldId id="290" r:id="rId36"/>
-    <p:sldId id="291" r:id="rId37"/>
-    <p:sldId id="292" r:id="rId38"/>
-    <p:sldId id="293" r:id="rId39"/>
-    <p:sldId id="294" r:id="rId40"/>
-    <p:sldId id="295" r:id="rId41"/>
-    <p:sldId id="296" r:id="rId42"/>
-    <p:sldId id="297" r:id="rId43"/>
-    <p:sldId id="298" r:id="rId44"/>
-    <p:sldId id="299" r:id="rId45"/>
+    <p:sldId id="262" r:id="rId7"/>
+    <p:sldId id="263" r:id="rId8"/>
+    <p:sldId id="264" r:id="rId9"/>
+    <p:sldId id="265" r:id="rId10"/>
+    <p:sldId id="266" r:id="rId11"/>
+    <p:sldId id="267" r:id="rId12"/>
+    <p:sldId id="268" r:id="rId13"/>
+    <p:sldId id="269" r:id="rId14"/>
+    <p:sldId id="270" r:id="rId15"/>
+    <p:sldId id="271" r:id="rId16"/>
+    <p:sldId id="272" r:id="rId17"/>
+    <p:sldId id="273" r:id="rId18"/>
+    <p:sldId id="274" r:id="rId19"/>
+    <p:sldId id="275" r:id="rId20"/>
+    <p:sldId id="276" r:id="rId21"/>
+    <p:sldId id="277" r:id="rId22"/>
+    <p:sldId id="278" r:id="rId23"/>
+    <p:sldId id="279" r:id="rId24"/>
+    <p:sldId id="280" r:id="rId25"/>
+    <p:sldId id="281" r:id="rId26"/>
+    <p:sldId id="282" r:id="rId27"/>
+    <p:sldId id="283" r:id="rId28"/>
+    <p:sldId id="284" r:id="rId29"/>
+    <p:sldId id="285" r:id="rId30"/>
+    <p:sldId id="286" r:id="rId31"/>
+    <p:sldId id="287" r:id="rId32"/>
+    <p:sldId id="288" r:id="rId33"/>
+    <p:sldId id="289" r:id="rId34"/>
+    <p:sldId id="290" r:id="rId35"/>
+    <p:sldId id="291" r:id="rId36"/>
+    <p:sldId id="292" r:id="rId37"/>
+    <p:sldId id="293" r:id="rId38"/>
+    <p:sldId id="294" r:id="rId39"/>
+    <p:sldId id="295" r:id="rId40"/>
+    <p:sldId id="296" r:id="rId41"/>
+    <p:sldId id="297" r:id="rId42"/>
+    <p:sldId id="298" r:id="rId43"/>
+    <p:sldId id="299" r:id="rId44"/>
   </p:sldIdLst>
   <p:sldSz cx="12192000" cy="6858000"/>
   <p:notesSz cx="6858000" cy="9144000"/>
@@ -304,7 +303,7 @@
           <a:p>
             <a:fld id="{F5EA312A-9D71-4435-8256-45584CD80182}" type="datetimeFigureOut">
               <a:rPr lang="es-MX" smtClean="0"/>
-              <a:t>14/05/2025</a:t>
+              <a:t>15/05/2025</a:t>
             </a:fld>
             <a:endParaRPr lang="es-MX"/>
           </a:p>
@@ -504,7 +503,7 @@
           <a:p>
             <a:fld id="{F5EA312A-9D71-4435-8256-45584CD80182}" type="datetimeFigureOut">
               <a:rPr lang="es-MX" smtClean="0"/>
-              <a:t>14/05/2025</a:t>
+              <a:t>15/05/2025</a:t>
             </a:fld>
             <a:endParaRPr lang="es-MX"/>
           </a:p>
@@ -714,7 +713,7 @@
           <a:p>
             <a:fld id="{F5EA312A-9D71-4435-8256-45584CD80182}" type="datetimeFigureOut">
               <a:rPr lang="es-MX" smtClean="0"/>
-              <a:t>14/05/2025</a:t>
+              <a:t>15/05/2025</a:t>
             </a:fld>
             <a:endParaRPr lang="es-MX"/>
           </a:p>
@@ -914,7 +913,7 @@
           <a:p>
             <a:fld id="{F5EA312A-9D71-4435-8256-45584CD80182}" type="datetimeFigureOut">
               <a:rPr lang="es-MX" smtClean="0"/>
-              <a:t>14/05/2025</a:t>
+              <a:t>15/05/2025</a:t>
             </a:fld>
             <a:endParaRPr lang="es-MX"/>
           </a:p>
@@ -1190,7 +1189,7 @@
           <a:p>
             <a:fld id="{F5EA312A-9D71-4435-8256-45584CD80182}" type="datetimeFigureOut">
               <a:rPr lang="es-MX" smtClean="0"/>
-              <a:t>14/05/2025</a:t>
+              <a:t>15/05/2025</a:t>
             </a:fld>
             <a:endParaRPr lang="es-MX"/>
           </a:p>
@@ -1458,7 +1457,7 @@
           <a:p>
             <a:fld id="{F5EA312A-9D71-4435-8256-45584CD80182}" type="datetimeFigureOut">
               <a:rPr lang="es-MX" smtClean="0"/>
-              <a:t>14/05/2025</a:t>
+              <a:t>15/05/2025</a:t>
             </a:fld>
             <a:endParaRPr lang="es-MX"/>
           </a:p>
@@ -1873,7 +1872,7 @@
           <a:p>
             <a:fld id="{F5EA312A-9D71-4435-8256-45584CD80182}" type="datetimeFigureOut">
               <a:rPr lang="es-MX" smtClean="0"/>
-              <a:t>14/05/2025</a:t>
+              <a:t>15/05/2025</a:t>
             </a:fld>
             <a:endParaRPr lang="es-MX"/>
           </a:p>
@@ -2015,7 +2014,7 @@
           <a:p>
             <a:fld id="{F5EA312A-9D71-4435-8256-45584CD80182}" type="datetimeFigureOut">
               <a:rPr lang="es-MX" smtClean="0"/>
-              <a:t>14/05/2025</a:t>
+              <a:t>15/05/2025</a:t>
             </a:fld>
             <a:endParaRPr lang="es-MX"/>
           </a:p>
@@ -2128,7 +2127,7 @@
           <a:p>
             <a:fld id="{F5EA312A-9D71-4435-8256-45584CD80182}" type="datetimeFigureOut">
               <a:rPr lang="es-MX" smtClean="0"/>
-              <a:t>14/05/2025</a:t>
+              <a:t>15/05/2025</a:t>
             </a:fld>
             <a:endParaRPr lang="es-MX"/>
           </a:p>
@@ -2441,7 +2440,7 @@
           <a:p>
             <a:fld id="{F5EA312A-9D71-4435-8256-45584CD80182}" type="datetimeFigureOut">
               <a:rPr lang="es-MX" smtClean="0"/>
-              <a:t>14/05/2025</a:t>
+              <a:t>15/05/2025</a:t>
             </a:fld>
             <a:endParaRPr lang="es-MX"/>
           </a:p>
@@ -2730,7 +2729,7 @@
           <a:p>
             <a:fld id="{F5EA312A-9D71-4435-8256-45584CD80182}" type="datetimeFigureOut">
               <a:rPr lang="es-MX" smtClean="0"/>
-              <a:t>14/05/2025</a:t>
+              <a:t>15/05/2025</a:t>
             </a:fld>
             <a:endParaRPr lang="es-MX"/>
           </a:p>
@@ -2973,7 +2972,7 @@
           <a:p>
             <a:fld id="{F5EA312A-9D71-4435-8256-45584CD80182}" type="datetimeFigureOut">
               <a:rPr lang="es-MX" smtClean="0"/>
-              <a:t>14/05/2025</a:t>
+              <a:t>15/05/2025</a:t>
             </a:fld>
             <a:endParaRPr lang="es-MX"/>
           </a:p>
@@ -3441,42 +3440,6 @@
         <p:cNvPr id="1" name="">
           <a:extLst>
             <a:ext uri="{FF2B5EF4-FFF2-40B4-BE49-F238E27FC236}">
-              <a16:creationId xmlns:a16="http://schemas.microsoft.com/office/drawing/2014/main" id="{6C1818F9-A4B4-5681-4BEA-E84A4C079374}"/>
-            </a:ext>
-          </a:extLst>
-        </p:cNvPr>
-        <p:cNvGrpSpPr/>
-        <p:nvPr/>
-      </p:nvGrpSpPr>
-      <p:grpSpPr>
-        <a:xfrm>
-          <a:off x="0" y="0"/>
-          <a:ext cx="0" cy="0"/>
-          <a:chOff x="0" y="0"/>
-          <a:chExt cx="0" cy="0"/>
-        </a:xfrm>
-      </p:grpSpPr>
-    </p:spTree>
-    <p:extLst>
-      <p:ext uri="{BB962C8B-B14F-4D97-AF65-F5344CB8AC3E}">
-        <p14:creationId xmlns:p14="http://schemas.microsoft.com/office/powerpoint/2010/main" val="1746157962"/>
-      </p:ext>
-    </p:extLst>
-  </p:cSld>
-  <p:clrMapOvr>
-    <a:masterClrMapping/>
-  </p:clrMapOvr>
-</p:sld>
-</file>
-
-<file path=ppt/slides/slide11.xml><?xml version="1.0" encoding="utf-8"?>
-<p:sld xmlns:a="http://schemas.openxmlformats.org/drawingml/2006/main" xmlns:r="http://schemas.openxmlformats.org/officeDocument/2006/relationships" xmlns:p="http://schemas.openxmlformats.org/presentationml/2006/main">
-  <p:cSld>
-    <p:spTree>
-      <p:nvGrpSpPr>
-        <p:cNvPr id="1" name="">
-          <a:extLst>
-            <a:ext uri="{FF2B5EF4-FFF2-40B4-BE49-F238E27FC236}">
               <a16:creationId xmlns:a16="http://schemas.microsoft.com/office/drawing/2014/main" id="{3BF3D991-AE40-1013-FCFE-11179CA8EBB8}"/>
             </a:ext>
           </a:extLst>
@@ -3505,7 +3468,7 @@
 </p:sld>
 </file>
 
-<file path=ppt/slides/slide12.xml><?xml version="1.0" encoding="utf-8"?>
+<file path=ppt/slides/slide11.xml><?xml version="1.0" encoding="utf-8"?>
 <p:sld xmlns:a="http://schemas.openxmlformats.org/drawingml/2006/main" xmlns:r="http://schemas.openxmlformats.org/officeDocument/2006/relationships" xmlns:p="http://schemas.openxmlformats.org/presentationml/2006/main">
   <p:cSld>
     <p:spTree>
@@ -3541,7 +3504,7 @@
 </p:sld>
 </file>
 
-<file path=ppt/slides/slide13.xml><?xml version="1.0" encoding="utf-8"?>
+<file path=ppt/slides/slide12.xml><?xml version="1.0" encoding="utf-8"?>
 <p:sld xmlns:a="http://schemas.openxmlformats.org/drawingml/2006/main" xmlns:r="http://schemas.openxmlformats.org/officeDocument/2006/relationships" xmlns:p="http://schemas.openxmlformats.org/presentationml/2006/main">
   <p:cSld>
     <p:spTree>
@@ -3577,7 +3540,7 @@
 </p:sld>
 </file>
 
-<file path=ppt/slides/slide14.xml><?xml version="1.0" encoding="utf-8"?>
+<file path=ppt/slides/slide13.xml><?xml version="1.0" encoding="utf-8"?>
 <p:sld xmlns:a="http://schemas.openxmlformats.org/drawingml/2006/main" xmlns:r="http://schemas.openxmlformats.org/officeDocument/2006/relationships" xmlns:p="http://schemas.openxmlformats.org/presentationml/2006/main">
   <p:cSld>
     <p:spTree>
@@ -3613,7 +3576,7 @@
 </p:sld>
 </file>
 
-<file path=ppt/slides/slide15.xml><?xml version="1.0" encoding="utf-8"?>
+<file path=ppt/slides/slide14.xml><?xml version="1.0" encoding="utf-8"?>
 <p:sld xmlns:a="http://schemas.openxmlformats.org/drawingml/2006/main" xmlns:r="http://schemas.openxmlformats.org/officeDocument/2006/relationships" xmlns:p="http://schemas.openxmlformats.org/presentationml/2006/main">
   <p:cSld>
     <p:spTree>
@@ -3649,7 +3612,7 @@
 </p:sld>
 </file>
 
-<file path=ppt/slides/slide16.xml><?xml version="1.0" encoding="utf-8"?>
+<file path=ppt/slides/slide15.xml><?xml version="1.0" encoding="utf-8"?>
 <p:sld xmlns:a="http://schemas.openxmlformats.org/drawingml/2006/main" xmlns:r="http://schemas.openxmlformats.org/officeDocument/2006/relationships" xmlns:p="http://schemas.openxmlformats.org/presentationml/2006/main">
   <p:cSld>
     <p:spTree>
@@ -3685,7 +3648,7 @@
 </p:sld>
 </file>
 
-<file path=ppt/slides/slide17.xml><?xml version="1.0" encoding="utf-8"?>
+<file path=ppt/slides/slide16.xml><?xml version="1.0" encoding="utf-8"?>
 <p:sld xmlns:a="http://schemas.openxmlformats.org/drawingml/2006/main" xmlns:r="http://schemas.openxmlformats.org/officeDocument/2006/relationships" xmlns:p="http://schemas.openxmlformats.org/presentationml/2006/main">
   <p:cSld>
     <p:spTree>
@@ -3721,7 +3684,7 @@
 </p:sld>
 </file>
 
-<file path=ppt/slides/slide18.xml><?xml version="1.0" encoding="utf-8"?>
+<file path=ppt/slides/slide17.xml><?xml version="1.0" encoding="utf-8"?>
 <p:sld xmlns:a="http://schemas.openxmlformats.org/drawingml/2006/main" xmlns:r="http://schemas.openxmlformats.org/officeDocument/2006/relationships" xmlns:p="http://schemas.openxmlformats.org/presentationml/2006/main">
   <p:cSld>
     <p:spTree>
@@ -3757,7 +3720,7 @@
 </p:sld>
 </file>
 
-<file path=ppt/slides/slide19.xml><?xml version="1.0" encoding="utf-8"?>
+<file path=ppt/slides/slide18.xml><?xml version="1.0" encoding="utf-8"?>
 <p:sld xmlns:a="http://schemas.openxmlformats.org/drawingml/2006/main" xmlns:r="http://schemas.openxmlformats.org/officeDocument/2006/relationships" xmlns:p="http://schemas.openxmlformats.org/presentationml/2006/main">
   <p:cSld>
     <p:spTree>
@@ -3784,6 +3747,42 @@
     <p:extLst>
       <p:ext uri="{BB962C8B-B14F-4D97-AF65-F5344CB8AC3E}">
         <p14:creationId xmlns:p14="http://schemas.microsoft.com/office/powerpoint/2010/main" val="2810580694"/>
+      </p:ext>
+    </p:extLst>
+  </p:cSld>
+  <p:clrMapOvr>
+    <a:masterClrMapping/>
+  </p:clrMapOvr>
+</p:sld>
+</file>
+
+<file path=ppt/slides/slide19.xml><?xml version="1.0" encoding="utf-8"?>
+<p:sld xmlns:a="http://schemas.openxmlformats.org/drawingml/2006/main" xmlns:r="http://schemas.openxmlformats.org/officeDocument/2006/relationships" xmlns:p="http://schemas.openxmlformats.org/presentationml/2006/main">
+  <p:cSld>
+    <p:spTree>
+      <p:nvGrpSpPr>
+        <p:cNvPr id="1" name="">
+          <a:extLst>
+            <a:ext uri="{FF2B5EF4-FFF2-40B4-BE49-F238E27FC236}">
+              <a16:creationId xmlns:a16="http://schemas.microsoft.com/office/drawing/2014/main" id="{2D93FA2D-FB43-200C-5885-A00AC5179C28}"/>
+            </a:ext>
+          </a:extLst>
+        </p:cNvPr>
+        <p:cNvGrpSpPr/>
+        <p:nvPr/>
+      </p:nvGrpSpPr>
+      <p:grpSpPr>
+        <a:xfrm>
+          <a:off x="0" y="0"/>
+          <a:ext cx="0" cy="0"/>
+          <a:chOff x="0" y="0"/>
+          <a:chExt cx="0" cy="0"/>
+        </a:xfrm>
+      </p:grpSpPr>
+    </p:spTree>
+    <p:extLst>
+      <p:ext uri="{BB962C8B-B14F-4D97-AF65-F5344CB8AC3E}">
+        <p14:creationId xmlns:p14="http://schemas.microsoft.com/office/powerpoint/2010/main" val="557047669"/>
       </p:ext>
     </p:extLst>
   </p:cSld>
@@ -3861,42 +3860,6 @@
         <p:cNvPr id="1" name="">
           <a:extLst>
             <a:ext uri="{FF2B5EF4-FFF2-40B4-BE49-F238E27FC236}">
-              <a16:creationId xmlns:a16="http://schemas.microsoft.com/office/drawing/2014/main" id="{2D93FA2D-FB43-200C-5885-A00AC5179C28}"/>
-            </a:ext>
-          </a:extLst>
-        </p:cNvPr>
-        <p:cNvGrpSpPr/>
-        <p:nvPr/>
-      </p:nvGrpSpPr>
-      <p:grpSpPr>
-        <a:xfrm>
-          <a:off x="0" y="0"/>
-          <a:ext cx="0" cy="0"/>
-          <a:chOff x="0" y="0"/>
-          <a:chExt cx="0" cy="0"/>
-        </a:xfrm>
-      </p:grpSpPr>
-    </p:spTree>
-    <p:extLst>
-      <p:ext uri="{BB962C8B-B14F-4D97-AF65-F5344CB8AC3E}">
-        <p14:creationId xmlns:p14="http://schemas.microsoft.com/office/powerpoint/2010/main" val="557047669"/>
-      </p:ext>
-    </p:extLst>
-  </p:cSld>
-  <p:clrMapOvr>
-    <a:masterClrMapping/>
-  </p:clrMapOvr>
-</p:sld>
-</file>
-
-<file path=ppt/slides/slide21.xml><?xml version="1.0" encoding="utf-8"?>
-<p:sld xmlns:a="http://schemas.openxmlformats.org/drawingml/2006/main" xmlns:r="http://schemas.openxmlformats.org/officeDocument/2006/relationships" xmlns:p="http://schemas.openxmlformats.org/presentationml/2006/main">
-  <p:cSld>
-    <p:spTree>
-      <p:nvGrpSpPr>
-        <p:cNvPr id="1" name="">
-          <a:extLst>
-            <a:ext uri="{FF2B5EF4-FFF2-40B4-BE49-F238E27FC236}">
               <a16:creationId xmlns:a16="http://schemas.microsoft.com/office/drawing/2014/main" id="{0CF214A7-B6B5-1A80-602E-99C0F22D6AAB}"/>
             </a:ext>
           </a:extLst>
@@ -3925,7 +3888,7 @@
 </p:sld>
 </file>
 
-<file path=ppt/slides/slide22.xml><?xml version="1.0" encoding="utf-8"?>
+<file path=ppt/slides/slide21.xml><?xml version="1.0" encoding="utf-8"?>
 <p:sld xmlns:a="http://schemas.openxmlformats.org/drawingml/2006/main" xmlns:r="http://schemas.openxmlformats.org/officeDocument/2006/relationships" xmlns:p="http://schemas.openxmlformats.org/presentationml/2006/main">
   <p:cSld>
     <p:spTree>
@@ -3961,7 +3924,7 @@
 </p:sld>
 </file>
 
-<file path=ppt/slides/slide23.xml><?xml version="1.0" encoding="utf-8"?>
+<file path=ppt/slides/slide22.xml><?xml version="1.0" encoding="utf-8"?>
 <p:sld xmlns:a="http://schemas.openxmlformats.org/drawingml/2006/main" xmlns:r="http://schemas.openxmlformats.org/officeDocument/2006/relationships" xmlns:p="http://schemas.openxmlformats.org/presentationml/2006/main">
   <p:cSld>
     <p:spTree>
@@ -3997,7 +3960,7 @@
 </p:sld>
 </file>
 
-<file path=ppt/slides/slide24.xml><?xml version="1.0" encoding="utf-8"?>
+<file path=ppt/slides/slide23.xml><?xml version="1.0" encoding="utf-8"?>
 <p:sld xmlns:a="http://schemas.openxmlformats.org/drawingml/2006/main" xmlns:r="http://schemas.openxmlformats.org/officeDocument/2006/relationships" xmlns:p="http://schemas.openxmlformats.org/presentationml/2006/main">
   <p:cSld>
     <p:spTree>
@@ -4033,7 +3996,7 @@
 </p:sld>
 </file>
 
-<file path=ppt/slides/slide25.xml><?xml version="1.0" encoding="utf-8"?>
+<file path=ppt/slides/slide24.xml><?xml version="1.0" encoding="utf-8"?>
 <p:sld xmlns:a="http://schemas.openxmlformats.org/drawingml/2006/main" xmlns:r="http://schemas.openxmlformats.org/officeDocument/2006/relationships" xmlns:p="http://schemas.openxmlformats.org/presentationml/2006/main">
   <p:cSld>
     <p:spTree>
@@ -4069,7 +4032,7 @@
 </p:sld>
 </file>
 
-<file path=ppt/slides/slide26.xml><?xml version="1.0" encoding="utf-8"?>
+<file path=ppt/slides/slide25.xml><?xml version="1.0" encoding="utf-8"?>
 <p:sld xmlns:a="http://schemas.openxmlformats.org/drawingml/2006/main" xmlns:r="http://schemas.openxmlformats.org/officeDocument/2006/relationships" xmlns:p="http://schemas.openxmlformats.org/presentationml/2006/main">
   <p:cSld>
     <p:spTree>
@@ -4105,7 +4068,7 @@
 </p:sld>
 </file>
 
-<file path=ppt/slides/slide27.xml><?xml version="1.0" encoding="utf-8"?>
+<file path=ppt/slides/slide26.xml><?xml version="1.0" encoding="utf-8"?>
 <p:sld xmlns:a="http://schemas.openxmlformats.org/drawingml/2006/main" xmlns:r="http://schemas.openxmlformats.org/officeDocument/2006/relationships" xmlns:p="http://schemas.openxmlformats.org/presentationml/2006/main">
   <p:cSld>
     <p:spTree>
@@ -4141,7 +4104,7 @@
 </p:sld>
 </file>
 
-<file path=ppt/slides/slide28.xml><?xml version="1.0" encoding="utf-8"?>
+<file path=ppt/slides/slide27.xml><?xml version="1.0" encoding="utf-8"?>
 <p:sld xmlns:a="http://schemas.openxmlformats.org/drawingml/2006/main" xmlns:r="http://schemas.openxmlformats.org/officeDocument/2006/relationships" xmlns:p="http://schemas.openxmlformats.org/presentationml/2006/main">
   <p:cSld>
     <p:spTree>
@@ -4177,7 +4140,7 @@
 </p:sld>
 </file>
 
-<file path=ppt/slides/slide29.xml><?xml version="1.0" encoding="utf-8"?>
+<file path=ppt/slides/slide28.xml><?xml version="1.0" encoding="utf-8"?>
 <p:sld xmlns:a="http://schemas.openxmlformats.org/drawingml/2006/main" xmlns:r="http://schemas.openxmlformats.org/officeDocument/2006/relationships" xmlns:p="http://schemas.openxmlformats.org/presentationml/2006/main">
   <p:cSld>
     <p:spTree>
@@ -4213,418 +4176,7 @@
 </p:sld>
 </file>
 
-<file path=ppt/slides/slide3.xml><?xml version="1.0" encoding="utf-8"?>
-<p:sld xmlns:a="http://schemas.openxmlformats.org/drawingml/2006/main" xmlns:r="http://schemas.openxmlformats.org/officeDocument/2006/relationships" xmlns:p="http://schemas.openxmlformats.org/presentationml/2006/main">
-  <p:cSld>
-    <p:spTree>
-      <p:nvGrpSpPr>
-        <p:cNvPr id="1" name="">
-          <a:extLst>
-            <a:ext uri="{FF2B5EF4-FFF2-40B4-BE49-F238E27FC236}">
-              <a16:creationId xmlns:a16="http://schemas.microsoft.com/office/drawing/2014/main" id="{80D4C2A7-5D84-2824-0858-4A3A34A75AD7}"/>
-            </a:ext>
-          </a:extLst>
-        </p:cNvPr>
-        <p:cNvGrpSpPr/>
-        <p:nvPr/>
-      </p:nvGrpSpPr>
-      <p:grpSpPr>
-        <a:xfrm>
-          <a:off x="0" y="0"/>
-          <a:ext cx="0" cy="0"/>
-          <a:chOff x="0" y="0"/>
-          <a:chExt cx="0" cy="0"/>
-        </a:xfrm>
-      </p:grpSpPr>
-      <p:pic>
-        <p:nvPicPr>
-          <p:cNvPr id="4" name="Imagen 3">
-            <a:extLst>
-              <a:ext uri="{FF2B5EF4-FFF2-40B4-BE49-F238E27FC236}">
-                <a16:creationId xmlns:a16="http://schemas.microsoft.com/office/drawing/2014/main" id="{28B741D5-960F-F061-0E07-822248FCC72E}"/>
-              </a:ext>
-            </a:extLst>
-          </p:cNvPr>
-          <p:cNvPicPr>
-            <a:picLocks noChangeAspect="1"/>
-          </p:cNvPicPr>
-          <p:nvPr/>
-        </p:nvPicPr>
-        <p:blipFill>
-          <a:blip r:embed="rId2"/>
-          <a:stretch>
-            <a:fillRect/>
-          </a:stretch>
-        </p:blipFill>
-        <p:spPr>
-          <a:xfrm>
-            <a:off x="272975" y="327296"/>
-            <a:ext cx="4814840" cy="2474786"/>
-          </a:xfrm>
-          <a:prstGeom prst="rect">
-            <a:avLst/>
-          </a:prstGeom>
-        </p:spPr>
-      </p:pic>
-      <p:pic>
-        <p:nvPicPr>
-          <p:cNvPr id="3" name="Imagen 2">
-            <a:extLst>
-              <a:ext uri="{FF2B5EF4-FFF2-40B4-BE49-F238E27FC236}">
-                <a16:creationId xmlns:a16="http://schemas.microsoft.com/office/drawing/2014/main" id="{073527F3-A001-8D4E-45CB-7710EDDD5E9E}"/>
-              </a:ext>
-            </a:extLst>
-          </p:cNvPr>
-          <p:cNvPicPr>
-            <a:picLocks noChangeAspect="1"/>
-          </p:cNvPicPr>
-          <p:nvPr/>
-        </p:nvPicPr>
-        <p:blipFill>
-          <a:blip r:embed="rId3"/>
-          <a:stretch>
-            <a:fillRect/>
-          </a:stretch>
-        </p:blipFill>
-        <p:spPr>
-          <a:xfrm>
-            <a:off x="5656846" y="463979"/>
-            <a:ext cx="5630061" cy="2600688"/>
-          </a:xfrm>
-          <a:prstGeom prst="rect">
-            <a:avLst/>
-          </a:prstGeom>
-        </p:spPr>
-      </p:pic>
-      <p:sp>
-        <p:nvSpPr>
-          <p:cNvPr id="6" name="CuadroTexto 5">
-            <a:extLst>
-              <a:ext uri="{FF2B5EF4-FFF2-40B4-BE49-F238E27FC236}">
-                <a16:creationId xmlns:a16="http://schemas.microsoft.com/office/drawing/2014/main" id="{85F13761-33DC-328E-765D-3A9E5DAD7A9D}"/>
-              </a:ext>
-            </a:extLst>
-          </p:cNvPr>
-          <p:cNvSpPr txBox="1"/>
-          <p:nvPr/>
-        </p:nvSpPr>
-        <p:spPr>
-          <a:xfrm>
-            <a:off x="5548923" y="3324442"/>
-            <a:ext cx="6096000" cy="1200329"/>
-          </a:xfrm>
-          <a:prstGeom prst="rect">
-            <a:avLst/>
-          </a:prstGeom>
-          <a:noFill/>
-        </p:spPr>
-        <p:txBody>
-          <a:bodyPr wrap="square">
-            <a:spAutoFit/>
-          </a:bodyPr>
-          <a:lstStyle/>
-          <a:p>
-            <a:r>
-              <a:rPr lang="es-MX" dirty="0"/>
-              <a:t>cd /c/</a:t>
-            </a:r>
-            <a:r>
-              <a:rPr lang="es-MX" dirty="0" err="1"/>
-              <a:t>Users</a:t>
-            </a:r>
-            <a:r>
-              <a:rPr lang="es-MX" dirty="0"/>
-              <a:t>/HP/Desktop/MFC/</a:t>
-            </a:r>
-            <a:r>
-              <a:rPr lang="es-MX" dirty="0" err="1"/>
-              <a:t>Aiventura</a:t>
-            </a:r>
-            <a:r>
-              <a:rPr lang="es-MX" dirty="0"/>
-              <a:t>/</a:t>
-            </a:r>
-            <a:r>
-              <a:rPr lang="es-MX" dirty="0" err="1"/>
-              <a:t>frontend</a:t>
-            </a:r>
-            <a:endParaRPr lang="es-MX" dirty="0"/>
-          </a:p>
-          <a:p>
-            <a:r>
-              <a:rPr lang="es-MX" dirty="0" err="1"/>
-              <a:t>emulator</a:t>
-            </a:r>
-            <a:r>
-              <a:rPr lang="es-MX" dirty="0"/>
-              <a:t> -</a:t>
-            </a:r>
-            <a:r>
-              <a:rPr lang="es-MX" dirty="0" err="1"/>
-              <a:t>avd</a:t>
-            </a:r>
-            <a:r>
-              <a:rPr lang="es-MX" dirty="0"/>
-              <a:t> Pixel 5</a:t>
-            </a:r>
-          </a:p>
-          <a:p>
-            <a:endParaRPr lang="es-MX" dirty="0"/>
-          </a:p>
-          <a:p>
-            <a:endParaRPr lang="es-MX" dirty="0"/>
-          </a:p>
-        </p:txBody>
-      </p:sp>
-      <p:sp>
-        <p:nvSpPr>
-          <p:cNvPr id="2" name="CuadroTexto 1">
-            <a:extLst>
-              <a:ext uri="{FF2B5EF4-FFF2-40B4-BE49-F238E27FC236}">
-                <a16:creationId xmlns:a16="http://schemas.microsoft.com/office/drawing/2014/main" id="{44B5680F-CE3A-A168-887A-BE4C40C88A00}"/>
-              </a:ext>
-            </a:extLst>
-          </p:cNvPr>
-          <p:cNvSpPr txBox="1"/>
-          <p:nvPr/>
-        </p:nvSpPr>
-        <p:spPr>
-          <a:xfrm>
-            <a:off x="207108" y="3054670"/>
-            <a:ext cx="5630061" cy="2800767"/>
-          </a:xfrm>
-          <a:prstGeom prst="rect">
-            <a:avLst/>
-          </a:prstGeom>
-          <a:noFill/>
-        </p:spPr>
-        <p:txBody>
-          <a:bodyPr wrap="square">
-            <a:spAutoFit/>
-          </a:bodyPr>
-          <a:lstStyle/>
-          <a:p>
-            <a:r>
-              <a:rPr lang="es-MX" dirty="0" err="1"/>
-              <a:t>git</a:t>
-            </a:r>
-            <a:r>
-              <a:rPr lang="es-MX" dirty="0"/>
-              <a:t> </a:t>
-            </a:r>
-            <a:r>
-              <a:rPr lang="es-MX" dirty="0" err="1"/>
-              <a:t>add</a:t>
-            </a:r>
-            <a:r>
-              <a:rPr lang="es-MX" dirty="0"/>
-              <a:t> .</a:t>
-            </a:r>
-          </a:p>
-          <a:p>
-            <a:r>
-              <a:rPr lang="es-MX" dirty="0" err="1"/>
-              <a:t>git</a:t>
-            </a:r>
-            <a:r>
-              <a:rPr lang="es-MX" dirty="0"/>
-              <a:t> </a:t>
-            </a:r>
-            <a:r>
-              <a:rPr lang="es-MX" dirty="0" err="1"/>
-              <a:t>commit</a:t>
-            </a:r>
-            <a:r>
-              <a:rPr lang="es-MX" dirty="0"/>
-              <a:t> -m “</a:t>
-            </a:r>
-            <a:r>
-              <a:rPr lang="es-MX" dirty="0" err="1"/>
-              <a:t>Updated</a:t>
-            </a:r>
-            <a:r>
-              <a:rPr lang="es-MX" dirty="0"/>
-              <a:t> </a:t>
-            </a:r>
-            <a:r>
-              <a:rPr lang="es-MX" dirty="0" err="1"/>
-              <a:t>code</a:t>
-            </a:r>
-            <a:r>
-              <a:rPr lang="es-MX" dirty="0"/>
-              <a:t>"</a:t>
-            </a:r>
-          </a:p>
-          <a:p>
-            <a:r>
-              <a:rPr lang="es-MX" dirty="0" err="1"/>
-              <a:t>git</a:t>
-            </a:r>
-            <a:r>
-              <a:rPr lang="es-MX" dirty="0"/>
-              <a:t> </a:t>
-            </a:r>
-            <a:r>
-              <a:rPr lang="es-MX" dirty="0" err="1"/>
-              <a:t>push</a:t>
-            </a:r>
-            <a:r>
-              <a:rPr lang="es-MX" dirty="0"/>
-              <a:t> </a:t>
-            </a:r>
-            <a:r>
-              <a:rPr lang="es-MX" dirty="0" err="1"/>
-              <a:t>origin</a:t>
-            </a:r>
-            <a:r>
-              <a:rPr lang="es-MX" dirty="0"/>
-              <a:t> </a:t>
-            </a:r>
-            <a:r>
-              <a:rPr lang="es-MX" dirty="0" err="1"/>
-              <a:t>main</a:t>
-            </a:r>
-            <a:endParaRPr lang="es-MX" dirty="0"/>
-          </a:p>
-          <a:p>
-            <a:endParaRPr lang="es-MX" dirty="0"/>
-          </a:p>
-          <a:p>
-            <a:r>
-              <a:rPr lang="es-MX" dirty="0" err="1"/>
-              <a:t>git</a:t>
-            </a:r>
-            <a:r>
-              <a:rPr lang="es-MX" dirty="0"/>
-              <a:t> </a:t>
-            </a:r>
-            <a:r>
-              <a:rPr lang="es-MX" dirty="0" err="1"/>
-              <a:t>fetch</a:t>
-            </a:r>
-            <a:r>
-              <a:rPr lang="es-MX" dirty="0"/>
-              <a:t> </a:t>
-            </a:r>
-            <a:r>
-              <a:rPr lang="es-MX" dirty="0" err="1"/>
-              <a:t>origin</a:t>
-            </a:r>
-            <a:r>
-              <a:rPr lang="es-MX" dirty="0"/>
-              <a:t> </a:t>
-            </a:r>
-            <a:r>
-              <a:rPr lang="es-MX" sz="1400" dirty="0"/>
-              <a:t>(actualiza lo que hay en </a:t>
-            </a:r>
-            <a:r>
-              <a:rPr lang="es-MX" sz="1400" dirty="0" err="1"/>
-              <a:t>github</a:t>
-            </a:r>
-            <a:r>
-              <a:rPr lang="es-MX" sz="1400" dirty="0"/>
-              <a:t> en mi maquina, no los archivos sino la estructura para que sepa que ramas hay, </a:t>
-            </a:r>
-            <a:r>
-              <a:rPr lang="es-MX" sz="1400" dirty="0" err="1"/>
-              <a:t>etc</a:t>
-            </a:r>
-            <a:r>
-              <a:rPr lang="es-MX" sz="1400" dirty="0"/>
-              <a:t>).</a:t>
-            </a:r>
-          </a:p>
-          <a:p>
-            <a:r>
-              <a:rPr lang="es-MX" dirty="0" err="1"/>
-              <a:t>git</a:t>
-            </a:r>
-            <a:r>
-              <a:rPr lang="es-MX" dirty="0"/>
-              <a:t> </a:t>
-            </a:r>
-            <a:r>
-              <a:rPr lang="es-MX" dirty="0" err="1"/>
-              <a:t>branch</a:t>
-            </a:r>
-            <a:r>
-              <a:rPr lang="es-MX" dirty="0"/>
-              <a:t> –a </a:t>
-            </a:r>
-            <a:r>
-              <a:rPr lang="es-MX" sz="1400" dirty="0"/>
-              <a:t>(para ver las ramas)</a:t>
-            </a:r>
-          </a:p>
-          <a:p>
-            <a:r>
-              <a:rPr lang="es-MX" dirty="0" err="1"/>
-              <a:t>git</a:t>
-            </a:r>
-            <a:r>
-              <a:rPr lang="es-MX" dirty="0"/>
-              <a:t> remote </a:t>
-            </a:r>
-            <a:r>
-              <a:rPr lang="es-MX" dirty="0" err="1"/>
-              <a:t>prune</a:t>
-            </a:r>
-            <a:r>
-              <a:rPr lang="es-MX" dirty="0"/>
-              <a:t> </a:t>
-            </a:r>
-            <a:r>
-              <a:rPr lang="es-MX" dirty="0" err="1"/>
-              <a:t>origin</a:t>
-            </a:r>
-            <a:r>
-              <a:rPr lang="es-MX" dirty="0"/>
-              <a:t> </a:t>
-            </a:r>
-            <a:r>
-              <a:rPr lang="es-MX" sz="1400" dirty="0"/>
-              <a:t>(elimina ramas remotas ya no existentes)</a:t>
-            </a:r>
-          </a:p>
-          <a:p>
-            <a:r>
-              <a:rPr lang="en-US" dirty="0"/>
-              <a:t>git checkout -b feature/</a:t>
-            </a:r>
-            <a:r>
-              <a:rPr lang="es-MX" sz="1400" dirty="0" err="1"/>
-              <a:t>nombre_rama</a:t>
-            </a:r>
-            <a:r>
-              <a:rPr lang="es-MX" sz="1400" dirty="0"/>
-              <a:t> (crea una </a:t>
-            </a:r>
-            <a:r>
-              <a:rPr lang="es-MX" sz="1400"/>
-              <a:t>rama nueva)</a:t>
-            </a:r>
-            <a:endParaRPr lang="es-MX" sz="1400" dirty="0"/>
-          </a:p>
-          <a:p>
-            <a:endParaRPr lang="es-MX" dirty="0"/>
-          </a:p>
-        </p:txBody>
-      </p:sp>
-    </p:spTree>
-    <p:extLst>
-      <p:ext uri="{BB962C8B-B14F-4D97-AF65-F5344CB8AC3E}">
-        <p14:creationId xmlns:p14="http://schemas.microsoft.com/office/powerpoint/2010/main" val="585208847"/>
-      </p:ext>
-    </p:extLst>
-  </p:cSld>
-  <p:clrMapOvr>
-    <a:masterClrMapping/>
-  </p:clrMapOvr>
-</p:sld>
-</file>
-
-<file path=ppt/slides/slide30.xml><?xml version="1.0" encoding="utf-8"?>
+<file path=ppt/slides/slide29.xml><?xml version="1.0" encoding="utf-8"?>
 <p:sld xmlns:a="http://schemas.openxmlformats.org/drawingml/2006/main" xmlns:r="http://schemas.openxmlformats.org/officeDocument/2006/relationships" xmlns:p="http://schemas.openxmlformats.org/presentationml/2006/main">
   <p:cSld>
     <p:spTree>
@@ -4660,7 +4212,413 @@
 </p:sld>
 </file>
 
-<file path=ppt/slides/slide31.xml><?xml version="1.0" encoding="utf-8"?>
+<file path=ppt/slides/slide3.xml><?xml version="1.0" encoding="utf-8"?>
+<p:sld xmlns:a="http://schemas.openxmlformats.org/drawingml/2006/main" xmlns:r="http://schemas.openxmlformats.org/officeDocument/2006/relationships" xmlns:p="http://schemas.openxmlformats.org/presentationml/2006/main">
+  <p:cSld>
+    <p:spTree>
+      <p:nvGrpSpPr>
+        <p:cNvPr id="1" name="">
+          <a:extLst>
+            <a:ext uri="{FF2B5EF4-FFF2-40B4-BE49-F238E27FC236}">
+              <a16:creationId xmlns:a16="http://schemas.microsoft.com/office/drawing/2014/main" id="{80D4C2A7-5D84-2824-0858-4A3A34A75AD7}"/>
+            </a:ext>
+          </a:extLst>
+        </p:cNvPr>
+        <p:cNvGrpSpPr/>
+        <p:nvPr/>
+      </p:nvGrpSpPr>
+      <p:grpSpPr>
+        <a:xfrm>
+          <a:off x="0" y="0"/>
+          <a:ext cx="0" cy="0"/>
+          <a:chOff x="0" y="0"/>
+          <a:chExt cx="0" cy="0"/>
+        </a:xfrm>
+      </p:grpSpPr>
+      <p:pic>
+        <p:nvPicPr>
+          <p:cNvPr id="4" name="Imagen 3">
+            <a:extLst>
+              <a:ext uri="{FF2B5EF4-FFF2-40B4-BE49-F238E27FC236}">
+                <a16:creationId xmlns:a16="http://schemas.microsoft.com/office/drawing/2014/main" id="{28B741D5-960F-F061-0E07-822248FCC72E}"/>
+              </a:ext>
+            </a:extLst>
+          </p:cNvPr>
+          <p:cNvPicPr>
+            <a:picLocks noChangeAspect="1"/>
+          </p:cNvPicPr>
+          <p:nvPr/>
+        </p:nvPicPr>
+        <p:blipFill>
+          <a:blip r:embed="rId2"/>
+          <a:stretch>
+            <a:fillRect/>
+          </a:stretch>
+        </p:blipFill>
+        <p:spPr>
+          <a:xfrm>
+            <a:off x="272975" y="327296"/>
+            <a:ext cx="4814840" cy="2474786"/>
+          </a:xfrm>
+          <a:prstGeom prst="rect">
+            <a:avLst/>
+          </a:prstGeom>
+        </p:spPr>
+      </p:pic>
+      <p:pic>
+        <p:nvPicPr>
+          <p:cNvPr id="3" name="Imagen 2">
+            <a:extLst>
+              <a:ext uri="{FF2B5EF4-FFF2-40B4-BE49-F238E27FC236}">
+                <a16:creationId xmlns:a16="http://schemas.microsoft.com/office/drawing/2014/main" id="{073527F3-A001-8D4E-45CB-7710EDDD5E9E}"/>
+              </a:ext>
+            </a:extLst>
+          </p:cNvPr>
+          <p:cNvPicPr>
+            <a:picLocks noChangeAspect="1"/>
+          </p:cNvPicPr>
+          <p:nvPr/>
+        </p:nvPicPr>
+        <p:blipFill>
+          <a:blip r:embed="rId3"/>
+          <a:stretch>
+            <a:fillRect/>
+          </a:stretch>
+        </p:blipFill>
+        <p:spPr>
+          <a:xfrm>
+            <a:off x="5656846" y="463979"/>
+            <a:ext cx="5630061" cy="2600688"/>
+          </a:xfrm>
+          <a:prstGeom prst="rect">
+            <a:avLst/>
+          </a:prstGeom>
+        </p:spPr>
+      </p:pic>
+      <p:sp>
+        <p:nvSpPr>
+          <p:cNvPr id="6" name="CuadroTexto 5">
+            <a:extLst>
+              <a:ext uri="{FF2B5EF4-FFF2-40B4-BE49-F238E27FC236}">
+                <a16:creationId xmlns:a16="http://schemas.microsoft.com/office/drawing/2014/main" id="{85F13761-33DC-328E-765D-3A9E5DAD7A9D}"/>
+              </a:ext>
+            </a:extLst>
+          </p:cNvPr>
+          <p:cNvSpPr txBox="1"/>
+          <p:nvPr/>
+        </p:nvSpPr>
+        <p:spPr>
+          <a:xfrm>
+            <a:off x="5548923" y="3324442"/>
+            <a:ext cx="6096000" cy="1200329"/>
+          </a:xfrm>
+          <a:prstGeom prst="rect">
+            <a:avLst/>
+          </a:prstGeom>
+          <a:noFill/>
+        </p:spPr>
+        <p:txBody>
+          <a:bodyPr wrap="square">
+            <a:spAutoFit/>
+          </a:bodyPr>
+          <a:lstStyle/>
+          <a:p>
+            <a:r>
+              <a:rPr lang="es-MX" dirty="0"/>
+              <a:t>cd /c/</a:t>
+            </a:r>
+            <a:r>
+              <a:rPr lang="es-MX" dirty="0" err="1"/>
+              <a:t>Users</a:t>
+            </a:r>
+            <a:r>
+              <a:rPr lang="es-MX" dirty="0"/>
+              <a:t>/HP/Desktop/MFC/</a:t>
+            </a:r>
+            <a:r>
+              <a:rPr lang="es-MX" dirty="0" err="1"/>
+              <a:t>Aiventura</a:t>
+            </a:r>
+            <a:r>
+              <a:rPr lang="es-MX" dirty="0"/>
+              <a:t>/</a:t>
+            </a:r>
+            <a:r>
+              <a:rPr lang="es-MX" dirty="0" err="1"/>
+              <a:t>frontend</a:t>
+            </a:r>
+            <a:endParaRPr lang="es-MX" dirty="0"/>
+          </a:p>
+          <a:p>
+            <a:r>
+              <a:rPr lang="es-MX" dirty="0" err="1"/>
+              <a:t>emulator</a:t>
+            </a:r>
+            <a:r>
+              <a:rPr lang="es-MX" dirty="0"/>
+              <a:t> -</a:t>
+            </a:r>
+            <a:r>
+              <a:rPr lang="es-MX" dirty="0" err="1"/>
+              <a:t>avd</a:t>
+            </a:r>
+            <a:r>
+              <a:rPr lang="es-MX" dirty="0"/>
+              <a:t> Pixel 5</a:t>
+            </a:r>
+          </a:p>
+          <a:p>
+            <a:endParaRPr lang="es-MX" dirty="0"/>
+          </a:p>
+          <a:p>
+            <a:endParaRPr lang="es-MX" dirty="0"/>
+          </a:p>
+        </p:txBody>
+      </p:sp>
+      <p:sp>
+        <p:nvSpPr>
+          <p:cNvPr id="2" name="CuadroTexto 1">
+            <a:extLst>
+              <a:ext uri="{FF2B5EF4-FFF2-40B4-BE49-F238E27FC236}">
+                <a16:creationId xmlns:a16="http://schemas.microsoft.com/office/drawing/2014/main" id="{44B5680F-CE3A-A168-887A-BE4C40C88A00}"/>
+              </a:ext>
+            </a:extLst>
+          </p:cNvPr>
+          <p:cNvSpPr txBox="1"/>
+          <p:nvPr/>
+        </p:nvSpPr>
+        <p:spPr>
+          <a:xfrm>
+            <a:off x="207108" y="3054670"/>
+            <a:ext cx="5630061" cy="2800767"/>
+          </a:xfrm>
+          <a:prstGeom prst="rect">
+            <a:avLst/>
+          </a:prstGeom>
+          <a:noFill/>
+        </p:spPr>
+        <p:txBody>
+          <a:bodyPr wrap="square">
+            <a:spAutoFit/>
+          </a:bodyPr>
+          <a:lstStyle/>
+          <a:p>
+            <a:r>
+              <a:rPr lang="es-MX" dirty="0" err="1"/>
+              <a:t>git</a:t>
+            </a:r>
+            <a:r>
+              <a:rPr lang="es-MX" dirty="0"/>
+              <a:t> </a:t>
+            </a:r>
+            <a:r>
+              <a:rPr lang="es-MX" dirty="0" err="1"/>
+              <a:t>add</a:t>
+            </a:r>
+            <a:r>
+              <a:rPr lang="es-MX" dirty="0"/>
+              <a:t> .</a:t>
+            </a:r>
+          </a:p>
+          <a:p>
+            <a:r>
+              <a:rPr lang="es-MX" dirty="0" err="1"/>
+              <a:t>git</a:t>
+            </a:r>
+            <a:r>
+              <a:rPr lang="es-MX" dirty="0"/>
+              <a:t> </a:t>
+            </a:r>
+            <a:r>
+              <a:rPr lang="es-MX" dirty="0" err="1"/>
+              <a:t>commit</a:t>
+            </a:r>
+            <a:r>
+              <a:rPr lang="es-MX" dirty="0"/>
+              <a:t> -m “</a:t>
+            </a:r>
+            <a:r>
+              <a:rPr lang="es-MX" dirty="0" err="1"/>
+              <a:t>Updated</a:t>
+            </a:r>
+            <a:r>
+              <a:rPr lang="es-MX" dirty="0"/>
+              <a:t> </a:t>
+            </a:r>
+            <a:r>
+              <a:rPr lang="es-MX" dirty="0" err="1"/>
+              <a:t>code</a:t>
+            </a:r>
+            <a:r>
+              <a:rPr lang="es-MX" dirty="0"/>
+              <a:t>"</a:t>
+            </a:r>
+          </a:p>
+          <a:p>
+            <a:r>
+              <a:rPr lang="es-MX" dirty="0" err="1"/>
+              <a:t>git</a:t>
+            </a:r>
+            <a:r>
+              <a:rPr lang="es-MX" dirty="0"/>
+              <a:t> </a:t>
+            </a:r>
+            <a:r>
+              <a:rPr lang="es-MX" dirty="0" err="1"/>
+              <a:t>push</a:t>
+            </a:r>
+            <a:r>
+              <a:rPr lang="es-MX" dirty="0"/>
+              <a:t> </a:t>
+            </a:r>
+            <a:r>
+              <a:rPr lang="es-MX" dirty="0" err="1"/>
+              <a:t>origin</a:t>
+            </a:r>
+            <a:r>
+              <a:rPr lang="es-MX" dirty="0"/>
+              <a:t> </a:t>
+            </a:r>
+            <a:r>
+              <a:rPr lang="es-MX" dirty="0" err="1"/>
+              <a:t>main</a:t>
+            </a:r>
+            <a:endParaRPr lang="es-MX" dirty="0"/>
+          </a:p>
+          <a:p>
+            <a:endParaRPr lang="es-MX" dirty="0"/>
+          </a:p>
+          <a:p>
+            <a:r>
+              <a:rPr lang="es-MX" dirty="0" err="1"/>
+              <a:t>git</a:t>
+            </a:r>
+            <a:r>
+              <a:rPr lang="es-MX" dirty="0"/>
+              <a:t> </a:t>
+            </a:r>
+            <a:r>
+              <a:rPr lang="es-MX" dirty="0" err="1"/>
+              <a:t>fetch</a:t>
+            </a:r>
+            <a:r>
+              <a:rPr lang="es-MX" dirty="0"/>
+              <a:t> </a:t>
+            </a:r>
+            <a:r>
+              <a:rPr lang="es-MX" dirty="0" err="1"/>
+              <a:t>origin</a:t>
+            </a:r>
+            <a:r>
+              <a:rPr lang="es-MX" dirty="0"/>
+              <a:t> </a:t>
+            </a:r>
+            <a:r>
+              <a:rPr lang="es-MX" sz="1400" dirty="0"/>
+              <a:t>(actualiza lo que hay en </a:t>
+            </a:r>
+            <a:r>
+              <a:rPr lang="es-MX" sz="1400" dirty="0" err="1"/>
+              <a:t>github</a:t>
+            </a:r>
+            <a:r>
+              <a:rPr lang="es-MX" sz="1400" dirty="0"/>
+              <a:t> en mi maquina, no los archivos sino la estructura para que sepa que ramas hay, </a:t>
+            </a:r>
+            <a:r>
+              <a:rPr lang="es-MX" sz="1400" dirty="0" err="1"/>
+              <a:t>etc</a:t>
+            </a:r>
+            <a:r>
+              <a:rPr lang="es-MX" sz="1400" dirty="0"/>
+              <a:t>).</a:t>
+            </a:r>
+          </a:p>
+          <a:p>
+            <a:r>
+              <a:rPr lang="es-MX" dirty="0" err="1"/>
+              <a:t>git</a:t>
+            </a:r>
+            <a:r>
+              <a:rPr lang="es-MX" dirty="0"/>
+              <a:t> </a:t>
+            </a:r>
+            <a:r>
+              <a:rPr lang="es-MX" dirty="0" err="1"/>
+              <a:t>branch</a:t>
+            </a:r>
+            <a:r>
+              <a:rPr lang="es-MX" dirty="0"/>
+              <a:t> –a </a:t>
+            </a:r>
+            <a:r>
+              <a:rPr lang="es-MX" sz="1400" dirty="0"/>
+              <a:t>(para ver las ramas)</a:t>
+            </a:r>
+          </a:p>
+          <a:p>
+            <a:r>
+              <a:rPr lang="es-MX" dirty="0" err="1"/>
+              <a:t>git</a:t>
+            </a:r>
+            <a:r>
+              <a:rPr lang="es-MX" dirty="0"/>
+              <a:t> remote </a:t>
+            </a:r>
+            <a:r>
+              <a:rPr lang="es-MX" dirty="0" err="1"/>
+              <a:t>prune</a:t>
+            </a:r>
+            <a:r>
+              <a:rPr lang="es-MX" dirty="0"/>
+              <a:t> </a:t>
+            </a:r>
+            <a:r>
+              <a:rPr lang="es-MX" dirty="0" err="1"/>
+              <a:t>origin</a:t>
+            </a:r>
+            <a:r>
+              <a:rPr lang="es-MX" dirty="0"/>
+              <a:t> </a:t>
+            </a:r>
+            <a:r>
+              <a:rPr lang="es-MX" sz="1400" dirty="0"/>
+              <a:t>(elimina ramas remotas ya no existentes)</a:t>
+            </a:r>
+          </a:p>
+          <a:p>
+            <a:r>
+              <a:rPr lang="en-US" dirty="0"/>
+              <a:t>git checkout -b feature/</a:t>
+            </a:r>
+            <a:r>
+              <a:rPr lang="es-MX" sz="1400" dirty="0" err="1"/>
+              <a:t>nombre_rama</a:t>
+            </a:r>
+            <a:r>
+              <a:rPr lang="es-MX" sz="1400" dirty="0"/>
+              <a:t> (crea una rama nueva)</a:t>
+            </a:r>
+          </a:p>
+          <a:p>
+            <a:endParaRPr lang="es-MX" dirty="0"/>
+          </a:p>
+        </p:txBody>
+      </p:sp>
+    </p:spTree>
+    <p:extLst>
+      <p:ext uri="{BB962C8B-B14F-4D97-AF65-F5344CB8AC3E}">
+        <p14:creationId xmlns:p14="http://schemas.microsoft.com/office/powerpoint/2010/main" val="585208847"/>
+      </p:ext>
+    </p:extLst>
+  </p:cSld>
+  <p:clrMapOvr>
+    <a:masterClrMapping/>
+  </p:clrMapOvr>
+</p:sld>
+</file>
+
+<file path=ppt/slides/slide30.xml><?xml version="1.0" encoding="utf-8"?>
 <p:sld xmlns:a="http://schemas.openxmlformats.org/drawingml/2006/main" xmlns:r="http://schemas.openxmlformats.org/officeDocument/2006/relationships" xmlns:p="http://schemas.openxmlformats.org/presentationml/2006/main">
   <p:cSld>
     <p:spTree>
@@ -4696,7 +4654,7 @@
 </p:sld>
 </file>
 
-<file path=ppt/slides/slide32.xml><?xml version="1.0" encoding="utf-8"?>
+<file path=ppt/slides/slide31.xml><?xml version="1.0" encoding="utf-8"?>
 <p:sld xmlns:a="http://schemas.openxmlformats.org/drawingml/2006/main" xmlns:r="http://schemas.openxmlformats.org/officeDocument/2006/relationships" xmlns:p="http://schemas.openxmlformats.org/presentationml/2006/main">
   <p:cSld>
     <p:spTree>
@@ -4732,7 +4690,7 @@
 </p:sld>
 </file>
 
-<file path=ppt/slides/slide33.xml><?xml version="1.0" encoding="utf-8"?>
+<file path=ppt/slides/slide32.xml><?xml version="1.0" encoding="utf-8"?>
 <p:sld xmlns:a="http://schemas.openxmlformats.org/drawingml/2006/main" xmlns:r="http://schemas.openxmlformats.org/officeDocument/2006/relationships" xmlns:p="http://schemas.openxmlformats.org/presentationml/2006/main">
   <p:cSld>
     <p:spTree>
@@ -4768,7 +4726,7 @@
 </p:sld>
 </file>
 
-<file path=ppt/slides/slide34.xml><?xml version="1.0" encoding="utf-8"?>
+<file path=ppt/slides/slide33.xml><?xml version="1.0" encoding="utf-8"?>
 <p:sld xmlns:a="http://schemas.openxmlformats.org/drawingml/2006/main" xmlns:r="http://schemas.openxmlformats.org/officeDocument/2006/relationships" xmlns:p="http://schemas.openxmlformats.org/presentationml/2006/main">
   <p:cSld>
     <p:spTree>
@@ -4804,7 +4762,7 @@
 </p:sld>
 </file>
 
-<file path=ppt/slides/slide35.xml><?xml version="1.0" encoding="utf-8"?>
+<file path=ppt/slides/slide34.xml><?xml version="1.0" encoding="utf-8"?>
 <p:sld xmlns:a="http://schemas.openxmlformats.org/drawingml/2006/main" xmlns:r="http://schemas.openxmlformats.org/officeDocument/2006/relationships" xmlns:p="http://schemas.openxmlformats.org/presentationml/2006/main">
   <p:cSld>
     <p:spTree>
@@ -4840,7 +4798,7 @@
 </p:sld>
 </file>
 
-<file path=ppt/slides/slide36.xml><?xml version="1.0" encoding="utf-8"?>
+<file path=ppt/slides/slide35.xml><?xml version="1.0" encoding="utf-8"?>
 <p:sld xmlns:a="http://schemas.openxmlformats.org/drawingml/2006/main" xmlns:r="http://schemas.openxmlformats.org/officeDocument/2006/relationships" xmlns:p="http://schemas.openxmlformats.org/presentationml/2006/main">
   <p:cSld>
     <p:spTree>
@@ -4876,7 +4834,7 @@
 </p:sld>
 </file>
 
-<file path=ppt/slides/slide37.xml><?xml version="1.0" encoding="utf-8"?>
+<file path=ppt/slides/slide36.xml><?xml version="1.0" encoding="utf-8"?>
 <p:sld xmlns:a="http://schemas.openxmlformats.org/drawingml/2006/main" xmlns:r="http://schemas.openxmlformats.org/officeDocument/2006/relationships" xmlns:p="http://schemas.openxmlformats.org/presentationml/2006/main">
   <p:cSld>
     <p:spTree>
@@ -4912,7 +4870,7 @@
 </p:sld>
 </file>
 
-<file path=ppt/slides/slide38.xml><?xml version="1.0" encoding="utf-8"?>
+<file path=ppt/slides/slide37.xml><?xml version="1.0" encoding="utf-8"?>
 <p:sld xmlns:a="http://schemas.openxmlformats.org/drawingml/2006/main" xmlns:r="http://schemas.openxmlformats.org/officeDocument/2006/relationships" xmlns:p="http://schemas.openxmlformats.org/presentationml/2006/main">
   <p:cSld>
     <p:spTree>
@@ -4948,7 +4906,7 @@
 </p:sld>
 </file>
 
-<file path=ppt/slides/slide39.xml><?xml version="1.0" encoding="utf-8"?>
+<file path=ppt/slides/slide38.xml><?xml version="1.0" encoding="utf-8"?>
 <p:sld xmlns:a="http://schemas.openxmlformats.org/drawingml/2006/main" xmlns:r="http://schemas.openxmlformats.org/officeDocument/2006/relationships" xmlns:p="http://schemas.openxmlformats.org/presentationml/2006/main">
   <p:cSld>
     <p:spTree>
@@ -4975,6 +4933,42 @@
     <p:extLst>
       <p:ext uri="{BB962C8B-B14F-4D97-AF65-F5344CB8AC3E}">
         <p14:creationId xmlns:p14="http://schemas.microsoft.com/office/powerpoint/2010/main" val="1657853480"/>
+      </p:ext>
+    </p:extLst>
+  </p:cSld>
+  <p:clrMapOvr>
+    <a:masterClrMapping/>
+  </p:clrMapOvr>
+</p:sld>
+</file>
+
+<file path=ppt/slides/slide39.xml><?xml version="1.0" encoding="utf-8"?>
+<p:sld xmlns:a="http://schemas.openxmlformats.org/drawingml/2006/main" xmlns:r="http://schemas.openxmlformats.org/officeDocument/2006/relationships" xmlns:p="http://schemas.openxmlformats.org/presentationml/2006/main">
+  <p:cSld>
+    <p:spTree>
+      <p:nvGrpSpPr>
+        <p:cNvPr id="1" name="">
+          <a:extLst>
+            <a:ext uri="{FF2B5EF4-FFF2-40B4-BE49-F238E27FC236}">
+              <a16:creationId xmlns:a16="http://schemas.microsoft.com/office/drawing/2014/main" id="{A9F18F6C-0D9B-D379-FCE4-6514CBA46661}"/>
+            </a:ext>
+          </a:extLst>
+        </p:cNvPr>
+        <p:cNvGrpSpPr/>
+        <p:nvPr/>
+      </p:nvGrpSpPr>
+      <p:grpSpPr>
+        <a:xfrm>
+          <a:off x="0" y="0"/>
+          <a:ext cx="0" cy="0"/>
+          <a:chOff x="0" y="0"/>
+          <a:chExt cx="0" cy="0"/>
+        </a:xfrm>
+      </p:grpSpPr>
+    </p:spTree>
+    <p:extLst>
+      <p:ext uri="{BB962C8B-B14F-4D97-AF65-F5344CB8AC3E}">
+        <p14:creationId xmlns:p14="http://schemas.microsoft.com/office/powerpoint/2010/main" val="1578400480"/>
       </p:ext>
     </p:extLst>
   </p:cSld>
@@ -5105,42 +5099,6 @@
         <p:cNvPr id="1" name="">
           <a:extLst>
             <a:ext uri="{FF2B5EF4-FFF2-40B4-BE49-F238E27FC236}">
-              <a16:creationId xmlns:a16="http://schemas.microsoft.com/office/drawing/2014/main" id="{A9F18F6C-0D9B-D379-FCE4-6514CBA46661}"/>
-            </a:ext>
-          </a:extLst>
-        </p:cNvPr>
-        <p:cNvGrpSpPr/>
-        <p:nvPr/>
-      </p:nvGrpSpPr>
-      <p:grpSpPr>
-        <a:xfrm>
-          <a:off x="0" y="0"/>
-          <a:ext cx="0" cy="0"/>
-          <a:chOff x="0" y="0"/>
-          <a:chExt cx="0" cy="0"/>
-        </a:xfrm>
-      </p:grpSpPr>
-    </p:spTree>
-    <p:extLst>
-      <p:ext uri="{BB962C8B-B14F-4D97-AF65-F5344CB8AC3E}">
-        <p14:creationId xmlns:p14="http://schemas.microsoft.com/office/powerpoint/2010/main" val="1578400480"/>
-      </p:ext>
-    </p:extLst>
-  </p:cSld>
-  <p:clrMapOvr>
-    <a:masterClrMapping/>
-  </p:clrMapOvr>
-</p:sld>
-</file>
-
-<file path=ppt/slides/slide41.xml><?xml version="1.0" encoding="utf-8"?>
-<p:sld xmlns:a="http://schemas.openxmlformats.org/drawingml/2006/main" xmlns:r="http://schemas.openxmlformats.org/officeDocument/2006/relationships" xmlns:p="http://schemas.openxmlformats.org/presentationml/2006/main">
-  <p:cSld>
-    <p:spTree>
-      <p:nvGrpSpPr>
-        <p:cNvPr id="1" name="">
-          <a:extLst>
-            <a:ext uri="{FF2B5EF4-FFF2-40B4-BE49-F238E27FC236}">
               <a16:creationId xmlns:a16="http://schemas.microsoft.com/office/drawing/2014/main" id="{758B468D-3177-81AC-BF79-33123595BE27}"/>
             </a:ext>
           </a:extLst>
@@ -5169,7 +5127,7 @@
 </p:sld>
 </file>
 
-<file path=ppt/slides/slide42.xml><?xml version="1.0" encoding="utf-8"?>
+<file path=ppt/slides/slide41.xml><?xml version="1.0" encoding="utf-8"?>
 <p:sld xmlns:a="http://schemas.openxmlformats.org/drawingml/2006/main" xmlns:r="http://schemas.openxmlformats.org/officeDocument/2006/relationships" xmlns:p="http://schemas.openxmlformats.org/presentationml/2006/main">
   <p:cSld>
     <p:spTree>
@@ -5205,7 +5163,7 @@
 </p:sld>
 </file>
 
-<file path=ppt/slides/slide43.xml><?xml version="1.0" encoding="utf-8"?>
+<file path=ppt/slides/slide42.xml><?xml version="1.0" encoding="utf-8"?>
 <p:sld xmlns:a="http://schemas.openxmlformats.org/drawingml/2006/main" xmlns:r="http://schemas.openxmlformats.org/officeDocument/2006/relationships" xmlns:p="http://schemas.openxmlformats.org/presentationml/2006/main">
   <p:cSld>
     <p:spTree>
@@ -5241,7 +5199,7 @@
 </p:sld>
 </file>
 
-<file path=ppt/slides/slide44.xml><?xml version="1.0" encoding="utf-8"?>
+<file path=ppt/slides/slide43.xml><?xml version="1.0" encoding="utf-8"?>
 <p:sld xmlns:a="http://schemas.openxmlformats.org/drawingml/2006/main" xmlns:r="http://schemas.openxmlformats.org/officeDocument/2006/relationships" xmlns:p="http://schemas.openxmlformats.org/presentationml/2006/main">
   <p:cSld>
     <p:spTree>
@@ -5300,6 +5258,246 @@
           <a:chExt cx="0" cy="0"/>
         </a:xfrm>
       </p:grpSpPr>
+      <p:sp>
+        <p:nvSpPr>
+          <p:cNvPr id="3" name="CuadroTexto 2">
+            <a:extLst>
+              <a:ext uri="{FF2B5EF4-FFF2-40B4-BE49-F238E27FC236}">
+                <a16:creationId xmlns:a16="http://schemas.microsoft.com/office/drawing/2014/main" id="{1D27B50C-992B-53BA-1D0B-ECC923B478FE}"/>
+              </a:ext>
+            </a:extLst>
+          </p:cNvPr>
+          <p:cNvSpPr txBox="1"/>
+          <p:nvPr/>
+        </p:nvSpPr>
+        <p:spPr>
+          <a:xfrm>
+            <a:off x="195384" y="213919"/>
+            <a:ext cx="11160369" cy="5663089"/>
+          </a:xfrm>
+          <a:prstGeom prst="rect">
+            <a:avLst/>
+          </a:prstGeom>
+          <a:noFill/>
+        </p:spPr>
+        <p:txBody>
+          <a:bodyPr wrap="square">
+            <a:spAutoFit/>
+          </a:bodyPr>
+          <a:lstStyle/>
+          <a:p>
+            <a:r>
+              <a:rPr lang="es-MX" b="1" dirty="0"/>
+              <a:t>PASOS PARA EJECUTAR EL BACKEND CON NGROK</a:t>
+            </a:r>
+          </a:p>
+          <a:p>
+            <a:endParaRPr lang="es-MX" dirty="0"/>
+          </a:p>
+          <a:p>
+            <a:r>
+              <a:rPr lang="es-MX" dirty="0"/>
+              <a:t>cd ~/Desktop/MFC/</a:t>
+            </a:r>
+            <a:r>
+              <a:rPr lang="es-MX" dirty="0" err="1"/>
+              <a:t>Aiventura</a:t>
+            </a:r>
+            <a:r>
+              <a:rPr lang="es-MX" dirty="0"/>
+              <a:t>/</a:t>
+            </a:r>
+            <a:r>
+              <a:rPr lang="es-MX" dirty="0" err="1"/>
+              <a:t>backend</a:t>
+            </a:r>
+            <a:endParaRPr lang="es-MX" dirty="0"/>
+          </a:p>
+          <a:p>
+            <a:r>
+              <a:rPr lang="es-MX" dirty="0" err="1"/>
+              <a:t>source</a:t>
+            </a:r>
+            <a:r>
+              <a:rPr lang="es-MX" dirty="0"/>
+              <a:t> </a:t>
+            </a:r>
+            <a:r>
+              <a:rPr lang="es-MX" dirty="0" err="1"/>
+              <a:t>venv</a:t>
+            </a:r>
+            <a:r>
+              <a:rPr lang="es-MX" dirty="0"/>
+              <a:t>/Scripts/</a:t>
+            </a:r>
+            <a:r>
+              <a:rPr lang="es-MX" dirty="0" err="1"/>
+              <a:t>activate</a:t>
+            </a:r>
+            <a:endParaRPr lang="es-MX" dirty="0"/>
+          </a:p>
+          <a:p>
+            <a:r>
+              <a:rPr lang="es-MX" dirty="0"/>
+              <a:t> </a:t>
+            </a:r>
+            <a:r>
+              <a:rPr lang="es-MX" dirty="0" err="1"/>
+              <a:t>python</a:t>
+            </a:r>
+            <a:r>
+              <a:rPr lang="es-MX" dirty="0"/>
+              <a:t> backend.py</a:t>
+            </a:r>
+          </a:p>
+          <a:p>
+            <a:r>
+              <a:rPr lang="es-MX" dirty="0">
+                <a:hlinkClick r:id="rId2"/>
+              </a:rPr>
+              <a:t>https://dd9b-189-238-152-52.ngrok-free.app</a:t>
+            </a:r>
+            <a:endParaRPr lang="es-MX" dirty="0"/>
+          </a:p>
+          <a:p>
+            <a:endParaRPr lang="es-MX" dirty="0"/>
+          </a:p>
+          <a:p>
+            <a:r>
+              <a:rPr lang="es-MX" dirty="0"/>
+              <a:t>cd ~/Desktop/MFC/</a:t>
+            </a:r>
+            <a:r>
+              <a:rPr lang="es-MX" dirty="0" err="1"/>
+              <a:t>Aiventura</a:t>
+            </a:r>
+            <a:r>
+              <a:rPr lang="es-MX" dirty="0"/>
+              <a:t>/</a:t>
+            </a:r>
+            <a:r>
+              <a:rPr lang="es-MX" dirty="0" err="1"/>
+              <a:t>frontend</a:t>
+            </a:r>
+            <a:endParaRPr lang="es-MX" dirty="0"/>
+          </a:p>
+          <a:p>
+            <a:endParaRPr lang="es-MX" dirty="0"/>
+          </a:p>
+          <a:p>
+            <a:endParaRPr lang="es-MX" dirty="0"/>
+          </a:p>
+          <a:p>
+            <a:r>
+              <a:rPr lang="es-MX" b="1" dirty="0"/>
+              <a:t>CREAR UN TAG </a:t>
+            </a:r>
+            <a:r>
+              <a:rPr lang="es-MX" dirty="0"/>
+              <a:t>del estado actual de mi código funcionando</a:t>
+            </a:r>
+          </a:p>
+          <a:p>
+            <a:r>
+              <a:rPr lang="es-MX" dirty="0"/>
+              <a:t>Ideal para marcar versiones estables o hitos importantes</a:t>
+            </a:r>
+          </a:p>
+          <a:p>
+            <a:endParaRPr lang="es-MX" dirty="0"/>
+          </a:p>
+          <a:p>
+            <a:r>
+              <a:rPr lang="es-MX" sz="2000" b="1" dirty="0" err="1"/>
+              <a:t>Flutter</a:t>
+            </a:r>
+            <a:r>
+              <a:rPr lang="es-MX" dirty="0"/>
+              <a:t> (colocado en la carpeta de </a:t>
+            </a:r>
+            <a:r>
+              <a:rPr lang="es-MX" dirty="0" err="1"/>
+              <a:t>frontend</a:t>
+            </a:r>
+            <a:r>
+              <a:rPr lang="es-MX" dirty="0"/>
+              <a:t> se ejecutan estos comandos para iniciar la app)</a:t>
+            </a:r>
+          </a:p>
+          <a:p>
+            <a:r>
+              <a:rPr lang="es-MX" dirty="0" err="1"/>
+              <a:t>flutter</a:t>
+            </a:r>
+            <a:r>
+              <a:rPr lang="es-MX" dirty="0"/>
+              <a:t> </a:t>
+            </a:r>
+            <a:r>
+              <a:rPr lang="es-MX" dirty="0" err="1"/>
+              <a:t>clean</a:t>
+            </a:r>
+            <a:endParaRPr lang="es-MX" dirty="0"/>
+          </a:p>
+          <a:p>
+            <a:r>
+              <a:rPr lang="es-MX" dirty="0" err="1"/>
+              <a:t>flutter</a:t>
+            </a:r>
+            <a:r>
+              <a:rPr lang="es-MX" dirty="0"/>
+              <a:t> pub </a:t>
+            </a:r>
+            <a:r>
+              <a:rPr lang="es-MX" dirty="0" err="1"/>
+              <a:t>get</a:t>
+            </a:r>
+            <a:endParaRPr lang="es-MX" dirty="0"/>
+          </a:p>
+          <a:p>
+            <a:r>
+              <a:rPr lang="es-MX" dirty="0" err="1"/>
+              <a:t>flutter</a:t>
+            </a:r>
+            <a:r>
+              <a:rPr lang="es-MX" dirty="0"/>
+              <a:t> run</a:t>
+            </a:r>
+          </a:p>
+          <a:p>
+            <a:endParaRPr lang="es-MX" dirty="0"/>
+          </a:p>
+          <a:p>
+            <a:r>
+              <a:rPr lang="es-MX" dirty="0"/>
+              <a:t>Matar el proceso de </a:t>
+            </a:r>
+            <a:r>
+              <a:rPr lang="es-MX" dirty="0" err="1"/>
+              <a:t>ngrok</a:t>
+            </a:r>
+            <a:r>
+              <a:rPr lang="es-MX" dirty="0"/>
+              <a:t> desde </a:t>
+            </a:r>
+            <a:r>
+              <a:rPr lang="es-MX" dirty="0" err="1"/>
+              <a:t>Gitbash</a:t>
+            </a:r>
+            <a:endParaRPr lang="es-MX" dirty="0"/>
+          </a:p>
+          <a:p>
+            <a:r>
+              <a:rPr lang="es-MX" dirty="0" err="1"/>
+              <a:t>taskkill</a:t>
+            </a:r>
+            <a:r>
+              <a:rPr lang="es-MX" dirty="0"/>
+              <a:t> //F //IM ngrok.exe</a:t>
+            </a:r>
+          </a:p>
+        </p:txBody>
+      </p:sp>
     </p:spTree>
     <p:extLst>
       <p:ext uri="{BB962C8B-B14F-4D97-AF65-F5344CB8AC3E}">
@@ -5314,42 +5512,6 @@
 </file>
 
 <file path=ppt/slides/slide6.xml><?xml version="1.0" encoding="utf-8"?>
-<p:sld xmlns:a="http://schemas.openxmlformats.org/drawingml/2006/main" xmlns:r="http://schemas.openxmlformats.org/officeDocument/2006/relationships" xmlns:p="http://schemas.openxmlformats.org/presentationml/2006/main">
-  <p:cSld>
-    <p:spTree>
-      <p:nvGrpSpPr>
-        <p:cNvPr id="1" name="">
-          <a:extLst>
-            <a:ext uri="{FF2B5EF4-FFF2-40B4-BE49-F238E27FC236}">
-              <a16:creationId xmlns:a16="http://schemas.microsoft.com/office/drawing/2014/main" id="{B3A5EE1F-16DC-7DDC-16D3-8D181E8150A6}"/>
-            </a:ext>
-          </a:extLst>
-        </p:cNvPr>
-        <p:cNvGrpSpPr/>
-        <p:nvPr/>
-      </p:nvGrpSpPr>
-      <p:grpSpPr>
-        <a:xfrm>
-          <a:off x="0" y="0"/>
-          <a:ext cx="0" cy="0"/>
-          <a:chOff x="0" y="0"/>
-          <a:chExt cx="0" cy="0"/>
-        </a:xfrm>
-      </p:grpSpPr>
-    </p:spTree>
-    <p:extLst>
-      <p:ext uri="{BB962C8B-B14F-4D97-AF65-F5344CB8AC3E}">
-        <p14:creationId xmlns:p14="http://schemas.microsoft.com/office/powerpoint/2010/main" val="4069498761"/>
-      </p:ext>
-    </p:extLst>
-  </p:cSld>
-  <p:clrMapOvr>
-    <a:masterClrMapping/>
-  </p:clrMapOvr>
-</p:sld>
-</file>
-
-<file path=ppt/slides/slide7.xml><?xml version="1.0" encoding="utf-8"?>
 <p:sld xmlns:a="http://schemas.openxmlformats.org/drawingml/2006/main" xmlns:r="http://schemas.openxmlformats.org/officeDocument/2006/relationships" xmlns:p="http://schemas.openxmlformats.org/presentationml/2006/main">
   <p:cSld>
     <p:spTree>
@@ -5372,6 +5534,49 @@
           <a:chExt cx="0" cy="0"/>
         </a:xfrm>
       </p:grpSpPr>
+      <p:sp>
+        <p:nvSpPr>
+          <p:cNvPr id="3" name="CuadroTexto 2">
+            <a:extLst>
+              <a:ext uri="{FF2B5EF4-FFF2-40B4-BE49-F238E27FC236}">
+                <a16:creationId xmlns:a16="http://schemas.microsoft.com/office/drawing/2014/main" id="{05F30823-15B6-434B-C58E-79F0241ED915}"/>
+              </a:ext>
+            </a:extLst>
+          </p:cNvPr>
+          <p:cNvSpPr txBox="1"/>
+          <p:nvPr/>
+        </p:nvSpPr>
+        <p:spPr>
+          <a:xfrm>
+            <a:off x="117231" y="184835"/>
+            <a:ext cx="10847754" cy="369332"/>
+          </a:xfrm>
+          <a:prstGeom prst="rect">
+            <a:avLst/>
+          </a:prstGeom>
+          <a:noFill/>
+        </p:spPr>
+        <p:txBody>
+          <a:bodyPr wrap="square">
+            <a:spAutoFit/>
+          </a:bodyPr>
+          <a:lstStyle/>
+          <a:p>
+            <a:r>
+              <a:rPr lang="es-MX" dirty="0"/>
+              <a:t>ok guarda este chat como referencia como </a:t>
+            </a:r>
+            <a:r>
+              <a:rPr lang="es-MX" b="1" dirty="0" err="1"/>
+              <a:t>Aiventura</a:t>
+            </a:r>
+            <a:r>
+              <a:rPr lang="es-MX" b="1" dirty="0"/>
+              <a:t> antes de PDF</a:t>
+            </a:r>
+          </a:p>
+        </p:txBody>
+      </p:sp>
     </p:spTree>
     <p:extLst>
       <p:ext uri="{BB962C8B-B14F-4D97-AF65-F5344CB8AC3E}">
@@ -5385,7 +5590,7 @@
 </p:sld>
 </file>
 
-<file path=ppt/slides/slide8.xml><?xml version="1.0" encoding="utf-8"?>
+<file path=ppt/slides/slide7.xml><?xml version="1.0" encoding="utf-8"?>
 <p:sld xmlns:a="http://schemas.openxmlformats.org/drawingml/2006/main" xmlns:r="http://schemas.openxmlformats.org/officeDocument/2006/relationships" xmlns:p="http://schemas.openxmlformats.org/presentationml/2006/main">
   <p:cSld>
     <p:spTree>
@@ -5421,7 +5626,7 @@
 </p:sld>
 </file>
 
-<file path=ppt/slides/slide9.xml><?xml version="1.0" encoding="utf-8"?>
+<file path=ppt/slides/slide8.xml><?xml version="1.0" encoding="utf-8"?>
 <p:sld xmlns:a="http://schemas.openxmlformats.org/drawingml/2006/main" xmlns:r="http://schemas.openxmlformats.org/officeDocument/2006/relationships" xmlns:p="http://schemas.openxmlformats.org/presentationml/2006/main">
   <p:cSld>
     <p:spTree>
@@ -5448,6 +5653,42 @@
     <p:extLst>
       <p:ext uri="{BB962C8B-B14F-4D97-AF65-F5344CB8AC3E}">
         <p14:creationId xmlns:p14="http://schemas.microsoft.com/office/powerpoint/2010/main" val="2473424831"/>
+      </p:ext>
+    </p:extLst>
+  </p:cSld>
+  <p:clrMapOvr>
+    <a:masterClrMapping/>
+  </p:clrMapOvr>
+</p:sld>
+</file>
+
+<file path=ppt/slides/slide9.xml><?xml version="1.0" encoding="utf-8"?>
+<p:sld xmlns:a="http://schemas.openxmlformats.org/drawingml/2006/main" xmlns:r="http://schemas.openxmlformats.org/officeDocument/2006/relationships" xmlns:p="http://schemas.openxmlformats.org/presentationml/2006/main">
+  <p:cSld>
+    <p:spTree>
+      <p:nvGrpSpPr>
+        <p:cNvPr id="1" name="">
+          <a:extLst>
+            <a:ext uri="{FF2B5EF4-FFF2-40B4-BE49-F238E27FC236}">
+              <a16:creationId xmlns:a16="http://schemas.microsoft.com/office/drawing/2014/main" id="{6C1818F9-A4B4-5681-4BEA-E84A4C079374}"/>
+            </a:ext>
+          </a:extLst>
+        </p:cNvPr>
+        <p:cNvGrpSpPr/>
+        <p:nvPr/>
+      </p:nvGrpSpPr>
+      <p:grpSpPr>
+        <a:xfrm>
+          <a:off x="0" y="0"/>
+          <a:ext cx="0" cy="0"/>
+          <a:chOff x="0" y="0"/>
+          <a:chExt cx="0" cy="0"/>
+        </a:xfrm>
+      </p:grpSpPr>
+    </p:spTree>
+    <p:extLst>
+      <p:ext uri="{BB962C8B-B14F-4D97-AF65-F5344CB8AC3E}">
+        <p14:creationId xmlns:p14="http://schemas.microsoft.com/office/powerpoint/2010/main" val="1746157962"/>
       </p:ext>
     </p:extLst>
   </p:cSld>

</xml_diff>

<commit_message>
Versión funcional con PDF e imagen DALL·E
</commit_message>
<xml_diff>
--- a/Others/Aiventura MFC.pptx
+++ b/Others/Aiventura MFC.pptx
@@ -303,7 +303,7 @@
           <a:p>
             <a:fld id="{F5EA312A-9D71-4435-8256-45584CD80182}" type="datetimeFigureOut">
               <a:rPr lang="es-MX" smtClean="0"/>
-              <a:t>15/05/2025</a:t>
+              <a:t>16/05/2025</a:t>
             </a:fld>
             <a:endParaRPr lang="es-MX"/>
           </a:p>
@@ -503,7 +503,7 @@
           <a:p>
             <a:fld id="{F5EA312A-9D71-4435-8256-45584CD80182}" type="datetimeFigureOut">
               <a:rPr lang="es-MX" smtClean="0"/>
-              <a:t>15/05/2025</a:t>
+              <a:t>16/05/2025</a:t>
             </a:fld>
             <a:endParaRPr lang="es-MX"/>
           </a:p>
@@ -713,7 +713,7 @@
           <a:p>
             <a:fld id="{F5EA312A-9D71-4435-8256-45584CD80182}" type="datetimeFigureOut">
               <a:rPr lang="es-MX" smtClean="0"/>
-              <a:t>15/05/2025</a:t>
+              <a:t>16/05/2025</a:t>
             </a:fld>
             <a:endParaRPr lang="es-MX"/>
           </a:p>
@@ -913,7 +913,7 @@
           <a:p>
             <a:fld id="{F5EA312A-9D71-4435-8256-45584CD80182}" type="datetimeFigureOut">
               <a:rPr lang="es-MX" smtClean="0"/>
-              <a:t>15/05/2025</a:t>
+              <a:t>16/05/2025</a:t>
             </a:fld>
             <a:endParaRPr lang="es-MX"/>
           </a:p>
@@ -1189,7 +1189,7 @@
           <a:p>
             <a:fld id="{F5EA312A-9D71-4435-8256-45584CD80182}" type="datetimeFigureOut">
               <a:rPr lang="es-MX" smtClean="0"/>
-              <a:t>15/05/2025</a:t>
+              <a:t>16/05/2025</a:t>
             </a:fld>
             <a:endParaRPr lang="es-MX"/>
           </a:p>
@@ -1457,7 +1457,7 @@
           <a:p>
             <a:fld id="{F5EA312A-9D71-4435-8256-45584CD80182}" type="datetimeFigureOut">
               <a:rPr lang="es-MX" smtClean="0"/>
-              <a:t>15/05/2025</a:t>
+              <a:t>16/05/2025</a:t>
             </a:fld>
             <a:endParaRPr lang="es-MX"/>
           </a:p>
@@ -1872,7 +1872,7 @@
           <a:p>
             <a:fld id="{F5EA312A-9D71-4435-8256-45584CD80182}" type="datetimeFigureOut">
               <a:rPr lang="es-MX" smtClean="0"/>
-              <a:t>15/05/2025</a:t>
+              <a:t>16/05/2025</a:t>
             </a:fld>
             <a:endParaRPr lang="es-MX"/>
           </a:p>
@@ -2014,7 +2014,7 @@
           <a:p>
             <a:fld id="{F5EA312A-9D71-4435-8256-45584CD80182}" type="datetimeFigureOut">
               <a:rPr lang="es-MX" smtClean="0"/>
-              <a:t>15/05/2025</a:t>
+              <a:t>16/05/2025</a:t>
             </a:fld>
             <a:endParaRPr lang="es-MX"/>
           </a:p>
@@ -2127,7 +2127,7 @@
           <a:p>
             <a:fld id="{F5EA312A-9D71-4435-8256-45584CD80182}" type="datetimeFigureOut">
               <a:rPr lang="es-MX" smtClean="0"/>
-              <a:t>15/05/2025</a:t>
+              <a:t>16/05/2025</a:t>
             </a:fld>
             <a:endParaRPr lang="es-MX"/>
           </a:p>
@@ -2440,7 +2440,7 @@
           <a:p>
             <a:fld id="{F5EA312A-9D71-4435-8256-45584CD80182}" type="datetimeFigureOut">
               <a:rPr lang="es-MX" smtClean="0"/>
-              <a:t>15/05/2025</a:t>
+              <a:t>16/05/2025</a:t>
             </a:fld>
             <a:endParaRPr lang="es-MX"/>
           </a:p>
@@ -2729,7 +2729,7 @@
           <a:p>
             <a:fld id="{F5EA312A-9D71-4435-8256-45584CD80182}" type="datetimeFigureOut">
               <a:rPr lang="es-MX" smtClean="0"/>
-              <a:t>15/05/2025</a:t>
+              <a:t>16/05/2025</a:t>
             </a:fld>
             <a:endParaRPr lang="es-MX"/>
           </a:p>
@@ -2972,7 +2972,7 @@
           <a:p>
             <a:fld id="{F5EA312A-9D71-4435-8256-45584CD80182}" type="datetimeFigureOut">
               <a:rPr lang="es-MX" smtClean="0"/>
-              <a:t>15/05/2025</a:t>
+              <a:t>16/05/2025</a:t>
             </a:fld>
             <a:endParaRPr lang="es-MX"/>
           </a:p>
@@ -4310,7 +4310,7 @@
         <p:spPr>
           <a:xfrm>
             <a:off x="5548923" y="3324442"/>
-            <a:ext cx="6096000" cy="1200329"/>
+            <a:ext cx="6096000" cy="2308324"/>
           </a:xfrm>
           <a:prstGeom prst="rect">
             <a:avLst/>
@@ -4371,6 +4371,80 @@
             <a:endParaRPr lang="es-MX" dirty="0"/>
           </a:p>
           <a:p>
+            <a:r>
+              <a:rPr lang="es-MX" dirty="0"/>
+              <a:t>Para entrar a mi rama actual</a:t>
+            </a:r>
+          </a:p>
+          <a:p>
+            <a:r>
+              <a:rPr lang="es-MX" dirty="0" err="1"/>
+              <a:t>git</a:t>
+            </a:r>
+            <a:r>
+              <a:rPr lang="es-MX" dirty="0"/>
+              <a:t> </a:t>
+            </a:r>
+            <a:r>
+              <a:rPr lang="es-MX" dirty="0" err="1"/>
+              <a:t>branch</a:t>
+            </a:r>
+            <a:endParaRPr lang="es-MX" dirty="0"/>
+          </a:p>
+          <a:p>
+            <a:r>
+              <a:rPr lang="es-MX" dirty="0" err="1">
+                <a:highlight>
+                  <a:srgbClr val="00FFFF"/>
+                </a:highlight>
+              </a:rPr>
+              <a:t>git</a:t>
+            </a:r>
+            <a:r>
+              <a:rPr lang="es-MX" dirty="0">
+                <a:highlight>
+                  <a:srgbClr val="00FFFF"/>
+                </a:highlight>
+              </a:rPr>
+              <a:t> </a:t>
+            </a:r>
+            <a:r>
+              <a:rPr lang="es-MX" dirty="0" err="1">
+                <a:highlight>
+                  <a:srgbClr val="00FFFF"/>
+                </a:highlight>
+              </a:rPr>
+              <a:t>checkout</a:t>
+            </a:r>
+            <a:r>
+              <a:rPr lang="es-MX" dirty="0">
+                <a:highlight>
+                  <a:srgbClr val="00FFFF"/>
+                </a:highlight>
+              </a:rPr>
+              <a:t> </a:t>
+            </a:r>
+            <a:r>
+              <a:rPr lang="es-MX" dirty="0" err="1">
+                <a:highlight>
+                  <a:srgbClr val="00FFFF"/>
+                </a:highlight>
+              </a:rPr>
+              <a:t>feature</a:t>
+            </a:r>
+            <a:r>
+              <a:rPr lang="es-MX" dirty="0">
+                <a:highlight>
+                  <a:srgbClr val="00FFFF"/>
+                </a:highlight>
+              </a:rPr>
+              <a:t>/continuacion-14may</a:t>
+            </a:r>
+          </a:p>
+          <a:p>
+            <a:endParaRPr lang="es-MX" dirty="0"/>
+          </a:p>
+          <a:p>
             <a:endParaRPr lang="es-MX" dirty="0"/>
           </a:p>
         </p:txBody>
@@ -4390,7 +4464,7 @@
         <p:spPr>
           <a:xfrm>
             <a:off x="207108" y="3054670"/>
-            <a:ext cx="5630061" cy="2800767"/>
+            <a:ext cx="5630061" cy="3354765"/>
           </a:xfrm>
           <a:prstGeom prst="rect">
             <a:avLst/>
@@ -4409,6 +4483,16 @@
             </a:r>
             <a:r>
               <a:rPr lang="es-MX" dirty="0"/>
+              <a:t> status</a:t>
+            </a:r>
+          </a:p>
+          <a:p>
+            <a:r>
+              <a:rPr lang="es-MX" dirty="0" err="1"/>
+              <a:t>git</a:t>
+            </a:r>
+            <a:r>
+              <a:rPr lang="es-MX" dirty="0"/>
               <a:t> </a:t>
             </a:r>
             <a:r>
@@ -4456,34 +4540,88 @@
           </a:p>
           <a:p>
             <a:r>
-              <a:rPr lang="es-MX" dirty="0" err="1"/>
+              <a:rPr lang="es-MX" dirty="0" err="1">
+                <a:highlight>
+                  <a:srgbClr val="00FFFF"/>
+                </a:highlight>
+              </a:rPr>
               <a:t>git</a:t>
             </a:r>
             <a:r>
+              <a:rPr lang="es-MX" dirty="0">
+                <a:highlight>
+                  <a:srgbClr val="00FFFF"/>
+                </a:highlight>
+              </a:rPr>
+              <a:t> </a:t>
+            </a:r>
+            <a:r>
+              <a:rPr lang="es-MX" dirty="0" err="1">
+                <a:highlight>
+                  <a:srgbClr val="00FFFF"/>
+                </a:highlight>
+              </a:rPr>
+              <a:t>push</a:t>
+            </a:r>
+            <a:r>
+              <a:rPr lang="es-MX" dirty="0">
+                <a:highlight>
+                  <a:srgbClr val="00FFFF"/>
+                </a:highlight>
+              </a:rPr>
+              <a:t> </a:t>
+            </a:r>
+            <a:r>
+              <a:rPr lang="es-MX" dirty="0" err="1">
+                <a:highlight>
+                  <a:srgbClr val="00FFFF"/>
+                </a:highlight>
+              </a:rPr>
+              <a:t>origin</a:t>
+            </a:r>
+            <a:r>
+              <a:rPr lang="es-MX" dirty="0">
+                <a:highlight>
+                  <a:srgbClr val="00FFFF"/>
+                </a:highlight>
+              </a:rPr>
+              <a:t> </a:t>
+            </a:r>
+            <a:r>
+              <a:rPr lang="es-MX" dirty="0" err="1">
+                <a:highlight>
+                  <a:srgbClr val="00FFFF"/>
+                </a:highlight>
+              </a:rPr>
+              <a:t>main</a:t>
+            </a:r>
+            <a:r>
+              <a:rPr lang="es-MX" dirty="0">
+                <a:highlight>
+                  <a:srgbClr val="00FFFF"/>
+                </a:highlight>
+              </a:rPr>
+              <a:t> </a:t>
+            </a:r>
+            <a:r>
               <a:rPr lang="es-MX" dirty="0"/>
-              <a:t> </a:t>
-            </a:r>
-            <a:r>
-              <a:rPr lang="es-MX" dirty="0" err="1"/>
-              <a:t>push</a:t>
-            </a:r>
-            <a:r>
-              <a:rPr lang="es-MX" dirty="0"/>
-              <a:t> </a:t>
-            </a:r>
-            <a:r>
-              <a:rPr lang="es-MX" dirty="0" err="1"/>
-              <a:t>origin</a:t>
-            </a:r>
-            <a:r>
-              <a:rPr lang="es-MX" dirty="0"/>
-              <a:t> </a:t>
-            </a:r>
-            <a:r>
-              <a:rPr lang="es-MX" dirty="0" err="1"/>
-              <a:t>main</a:t>
-            </a:r>
-            <a:endParaRPr lang="es-MX" dirty="0"/>
+              <a:t>o puede ser a la rama como abajo</a:t>
+            </a:r>
+          </a:p>
+          <a:p>
+            <a:r>
+              <a:rPr lang="en-US" dirty="0">
+                <a:highlight>
+                  <a:srgbClr val="00FFFF"/>
+                </a:highlight>
+              </a:rPr>
+              <a:t>git push origin feature/continuacion-14may</a:t>
+            </a:r>
+            <a:endParaRPr lang="es-MX" dirty="0">
+              <a:highlight>
+                <a:srgbClr val="00FFFF"/>
+              </a:highlight>
+            </a:endParaRPr>
           </a:p>
           <a:p>
             <a:endParaRPr lang="es-MX" dirty="0"/>
@@ -5273,7 +5411,7 @@
         <p:spPr>
           <a:xfrm>
             <a:off x="195384" y="213919"/>
-            <a:ext cx="11160369" cy="5663089"/>
+            <a:ext cx="11160369" cy="5109091"/>
           </a:xfrm>
           <a:prstGeom prst="rect">
             <a:avLst/>
@@ -5389,25 +5527,6 @@
           </a:p>
           <a:p>
             <a:r>
-              <a:rPr lang="es-MX" b="1" dirty="0"/>
-              <a:t>CREAR UN TAG </a:t>
-            </a:r>
-            <a:r>
-              <a:rPr lang="es-MX" dirty="0"/>
-              <a:t>del estado actual de mi código funcionando</a:t>
-            </a:r>
-          </a:p>
-          <a:p>
-            <a:r>
-              <a:rPr lang="es-MX" dirty="0"/>
-              <a:t>Ideal para marcar versiones estables o hitos importantes</a:t>
-            </a:r>
-          </a:p>
-          <a:p>
-            <a:endParaRPr lang="es-MX" dirty="0"/>
-          </a:p>
-          <a:p>
-            <a:r>
               <a:rPr lang="es-MX" sz="2000" b="1" dirty="0" err="1"/>
               <a:t>Flutter</a:t>
             </a:r>
@@ -5427,7 +5546,7 @@
           <a:p>
             <a:r>
               <a:rPr lang="es-MX" dirty="0" err="1"/>
-              <a:t>flutter</a:t>
+              <a:t>Flutter</a:t>
             </a:r>
             <a:r>
               <a:rPr lang="es-MX" dirty="0"/>
@@ -5435,7 +5554,7 @@
             </a:r>
             <a:r>
               <a:rPr lang="es-MX" dirty="0" err="1"/>
-              <a:t>clean</a:t>
+              <a:t>devices</a:t>
             </a:r>
             <a:endParaRPr lang="es-MX" dirty="0"/>
           </a:p>
@@ -5446,6 +5565,21 @@
             </a:r>
             <a:r>
               <a:rPr lang="es-MX" dirty="0"/>
+              <a:t> </a:t>
+            </a:r>
+            <a:r>
+              <a:rPr lang="es-MX" dirty="0" err="1"/>
+              <a:t>clean</a:t>
+            </a:r>
+            <a:endParaRPr lang="es-MX" dirty="0"/>
+          </a:p>
+          <a:p>
+            <a:r>
+              <a:rPr lang="es-MX" dirty="0" err="1"/>
+              <a:t>flutter</a:t>
+            </a:r>
+            <a:r>
+              <a:rPr lang="es-MX" dirty="0"/>
               <a:t> pub </a:t>
             </a:r>
             <a:r>
@@ -5498,6 +5632,36 @@
           </a:p>
         </p:txBody>
       </p:sp>
+      <p:pic>
+        <p:nvPicPr>
+          <p:cNvPr id="4" name="Imagen 3">
+            <a:extLst>
+              <a:ext uri="{FF2B5EF4-FFF2-40B4-BE49-F238E27FC236}">
+                <a16:creationId xmlns:a16="http://schemas.microsoft.com/office/drawing/2014/main" id="{20E70B0D-D4C9-DAE6-D406-9CB2B1992D7A}"/>
+              </a:ext>
+            </a:extLst>
+          </p:cNvPr>
+          <p:cNvPicPr>
+            <a:picLocks noChangeAspect="1"/>
+          </p:cNvPicPr>
+          <p:nvPr/>
+        </p:nvPicPr>
+        <p:blipFill>
+          <a:blip r:embed="rId3"/>
+          <a:stretch>
+            <a:fillRect/>
+          </a:stretch>
+        </p:blipFill>
+        <p:spPr>
+          <a:xfrm>
+            <a:off x="4733607" y="3957549"/>
+            <a:ext cx="6966672" cy="1938426"/>
+          </a:xfrm>
+          <a:prstGeom prst="rect">
+            <a:avLst/>
+          </a:prstGeom>
+        </p:spPr>
+      </p:pic>
     </p:spTree>
     <p:extLst>
       <p:ext uri="{BB962C8B-B14F-4D97-AF65-F5344CB8AC3E}">
@@ -5549,7 +5713,7 @@
         <p:spPr>
           <a:xfrm>
             <a:off x="117231" y="184835"/>
-            <a:ext cx="10847754" cy="369332"/>
+            <a:ext cx="10847754" cy="3970318"/>
           </a:xfrm>
           <a:prstGeom prst="rect">
             <a:avLst/>
@@ -5574,6 +5738,107 @@
               <a:rPr lang="es-MX" b="1" dirty="0"/>
               <a:t> antes de PDF</a:t>
             </a:r>
+          </a:p>
+          <a:p>
+            <a:endParaRPr lang="es-MX" b="1" dirty="0"/>
+          </a:p>
+          <a:p>
+            <a:endParaRPr lang="es-MX" b="1" dirty="0"/>
+          </a:p>
+          <a:p>
+            <a:endParaRPr lang="es-MX" dirty="0"/>
+          </a:p>
+          <a:p>
+            <a:r>
+              <a:rPr lang="es-MX" b="1" dirty="0"/>
+              <a:t>CREAR UN TAG </a:t>
+            </a:r>
+            <a:r>
+              <a:rPr lang="es-MX" dirty="0"/>
+              <a:t>del estado actual de mi código funcionando</a:t>
+            </a:r>
+          </a:p>
+          <a:p>
+            <a:r>
+              <a:rPr lang="es-MX" dirty="0"/>
+              <a:t>Ideal para marcar versiones estables o hitos importantes</a:t>
+            </a:r>
+          </a:p>
+          <a:p>
+            <a:endParaRPr lang="es-MX" dirty="0"/>
+          </a:p>
+          <a:p>
+            <a:r>
+              <a:rPr lang="es-MX" dirty="0" err="1"/>
+              <a:t>git</a:t>
+            </a:r>
+            <a:r>
+              <a:rPr lang="es-MX" dirty="0"/>
+              <a:t> status</a:t>
+            </a:r>
+          </a:p>
+          <a:p>
+            <a:r>
+              <a:rPr lang="es-MX" dirty="0" err="1"/>
+              <a:t>git</a:t>
+            </a:r>
+            <a:r>
+              <a:rPr lang="es-MX" dirty="0"/>
+              <a:t> </a:t>
+            </a:r>
+            <a:r>
+              <a:rPr lang="es-MX" dirty="0" err="1"/>
+              <a:t>add</a:t>
+            </a:r>
+            <a:r>
+              <a:rPr lang="es-MX" dirty="0"/>
+              <a:t> .</a:t>
+            </a:r>
+          </a:p>
+          <a:p>
+            <a:r>
+              <a:rPr lang="es-MX" dirty="0" err="1"/>
+              <a:t>git</a:t>
+            </a:r>
+            <a:r>
+              <a:rPr lang="es-MX" dirty="0"/>
+              <a:t> tag avance-15may</a:t>
+            </a:r>
+          </a:p>
+          <a:p>
+            <a:r>
+              <a:rPr lang="es-MX" dirty="0" err="1"/>
+              <a:t>git</a:t>
+            </a:r>
+            <a:r>
+              <a:rPr lang="es-MX" dirty="0"/>
+              <a:t> </a:t>
+            </a:r>
+            <a:r>
+              <a:rPr lang="es-MX" dirty="0" err="1"/>
+              <a:t>push</a:t>
+            </a:r>
+            <a:r>
+              <a:rPr lang="es-MX" dirty="0"/>
+              <a:t> </a:t>
+            </a:r>
+            <a:r>
+              <a:rPr lang="es-MX" dirty="0" err="1"/>
+              <a:t>origin</a:t>
+            </a:r>
+            <a:r>
+              <a:rPr lang="es-MX" dirty="0"/>
+              <a:t> avance-15may</a:t>
+            </a:r>
+          </a:p>
+          <a:p>
+            <a:endParaRPr lang="es-MX" dirty="0"/>
+          </a:p>
+          <a:p>
+            <a:endParaRPr lang="es-MX" dirty="0"/>
+          </a:p>
+          <a:p>
+            <a:endParaRPr lang="es-MX" dirty="0"/>
           </a:p>
         </p:txBody>
       </p:sp>
@@ -5613,6 +5878,495 @@
           <a:chExt cx="0" cy="0"/>
         </a:xfrm>
       </p:grpSpPr>
+      <p:pic>
+        <p:nvPicPr>
+          <p:cNvPr id="3" name="Imagen 2">
+            <a:extLst>
+              <a:ext uri="{FF2B5EF4-FFF2-40B4-BE49-F238E27FC236}">
+                <a16:creationId xmlns:a16="http://schemas.microsoft.com/office/drawing/2014/main" id="{97E23E63-E8EE-3ED7-923F-C5B8AAB50AD9}"/>
+              </a:ext>
+            </a:extLst>
+          </p:cNvPr>
+          <p:cNvPicPr>
+            <a:picLocks noChangeAspect="1"/>
+          </p:cNvPicPr>
+          <p:nvPr/>
+        </p:nvPicPr>
+        <p:blipFill>
+          <a:blip r:embed="rId2"/>
+          <a:stretch>
+            <a:fillRect/>
+          </a:stretch>
+        </p:blipFill>
+        <p:spPr>
+          <a:xfrm>
+            <a:off x="39333" y="0"/>
+            <a:ext cx="800212" cy="228632"/>
+          </a:xfrm>
+          <a:prstGeom prst="rect">
+            <a:avLst/>
+          </a:prstGeom>
+        </p:spPr>
+      </p:pic>
+      <p:pic>
+        <p:nvPicPr>
+          <p:cNvPr id="5" name="Imagen 4">
+            <a:extLst>
+              <a:ext uri="{FF2B5EF4-FFF2-40B4-BE49-F238E27FC236}">
+                <a16:creationId xmlns:a16="http://schemas.microsoft.com/office/drawing/2014/main" id="{7FA69BB3-AD47-DBC3-71BA-5949B32E009F}"/>
+              </a:ext>
+            </a:extLst>
+          </p:cNvPr>
+          <p:cNvPicPr>
+            <a:picLocks noChangeAspect="1"/>
+          </p:cNvPicPr>
+          <p:nvPr/>
+        </p:nvPicPr>
+        <p:blipFill>
+          <a:blip r:embed="rId3"/>
+          <a:stretch>
+            <a:fillRect/>
+          </a:stretch>
+        </p:blipFill>
+        <p:spPr>
+          <a:xfrm>
+            <a:off x="839545" y="297770"/>
+            <a:ext cx="971686" cy="1343212"/>
+          </a:xfrm>
+          <a:prstGeom prst="rect">
+            <a:avLst/>
+          </a:prstGeom>
+        </p:spPr>
+      </p:pic>
+      <p:pic>
+        <p:nvPicPr>
+          <p:cNvPr id="7" name="Imagen 6">
+            <a:extLst>
+              <a:ext uri="{FF2B5EF4-FFF2-40B4-BE49-F238E27FC236}">
+                <a16:creationId xmlns:a16="http://schemas.microsoft.com/office/drawing/2014/main" id="{EA82B1F3-40B7-3B8F-9599-413CC2949847}"/>
+              </a:ext>
+            </a:extLst>
+          </p:cNvPr>
+          <p:cNvPicPr>
+            <a:picLocks noChangeAspect="1"/>
+          </p:cNvPicPr>
+          <p:nvPr/>
+        </p:nvPicPr>
+        <p:blipFill>
+          <a:blip r:embed="rId4"/>
+          <a:stretch>
+            <a:fillRect/>
+          </a:stretch>
+        </p:blipFill>
+        <p:spPr>
+          <a:xfrm>
+            <a:off x="1811231" y="1751887"/>
+            <a:ext cx="1219370" cy="1371791"/>
+          </a:xfrm>
+          <a:prstGeom prst="rect">
+            <a:avLst/>
+          </a:prstGeom>
+        </p:spPr>
+      </p:pic>
+      <p:pic>
+        <p:nvPicPr>
+          <p:cNvPr id="9" name="Imagen 8">
+            <a:extLst>
+              <a:ext uri="{FF2B5EF4-FFF2-40B4-BE49-F238E27FC236}">
+                <a16:creationId xmlns:a16="http://schemas.microsoft.com/office/drawing/2014/main" id="{FC38AD2B-F492-8C1B-DA4E-3D13FC70A351}"/>
+              </a:ext>
+            </a:extLst>
+          </p:cNvPr>
+          <p:cNvPicPr>
+            <a:picLocks noChangeAspect="1"/>
+          </p:cNvPicPr>
+          <p:nvPr/>
+        </p:nvPicPr>
+        <p:blipFill>
+          <a:blip r:embed="rId5"/>
+          <a:stretch>
+            <a:fillRect/>
+          </a:stretch>
+        </p:blipFill>
+        <p:spPr>
+          <a:xfrm>
+            <a:off x="3133765" y="1751887"/>
+            <a:ext cx="1619476" cy="5106113"/>
+          </a:xfrm>
+          <a:prstGeom prst="rect">
+            <a:avLst/>
+          </a:prstGeom>
+        </p:spPr>
+      </p:pic>
+      <p:pic>
+        <p:nvPicPr>
+          <p:cNvPr id="11" name="Imagen 10">
+            <a:extLst>
+              <a:ext uri="{FF2B5EF4-FFF2-40B4-BE49-F238E27FC236}">
+                <a16:creationId xmlns:a16="http://schemas.microsoft.com/office/drawing/2014/main" id="{011EAFBC-FFF6-D9FC-4772-9C68FA15460B}"/>
+              </a:ext>
+            </a:extLst>
+          </p:cNvPr>
+          <p:cNvPicPr>
+            <a:picLocks noChangeAspect="1"/>
+          </p:cNvPicPr>
+          <p:nvPr/>
+        </p:nvPicPr>
+        <p:blipFill>
+          <a:blip r:embed="rId6"/>
+          <a:stretch>
+            <a:fillRect/>
+          </a:stretch>
+        </p:blipFill>
+        <p:spPr>
+          <a:xfrm>
+            <a:off x="4753241" y="3123678"/>
+            <a:ext cx="981212" cy="1124107"/>
+          </a:xfrm>
+          <a:prstGeom prst="rect">
+            <a:avLst/>
+          </a:prstGeom>
+        </p:spPr>
+      </p:pic>
+      <p:pic>
+        <p:nvPicPr>
+          <p:cNvPr id="13" name="Imagen 12">
+            <a:extLst>
+              <a:ext uri="{FF2B5EF4-FFF2-40B4-BE49-F238E27FC236}">
+                <a16:creationId xmlns:a16="http://schemas.microsoft.com/office/drawing/2014/main" id="{FD1BDB5D-ADB9-90E6-E2E6-7FA4DFA01EF9}"/>
+              </a:ext>
+            </a:extLst>
+          </p:cNvPr>
+          <p:cNvPicPr>
+            <a:picLocks noChangeAspect="1"/>
+          </p:cNvPicPr>
+          <p:nvPr/>
+        </p:nvPicPr>
+        <p:blipFill>
+          <a:blip r:embed="rId7"/>
+          <a:stretch>
+            <a:fillRect/>
+          </a:stretch>
+        </p:blipFill>
+        <p:spPr>
+          <a:xfrm>
+            <a:off x="6372717" y="3123678"/>
+            <a:ext cx="1381318" cy="1600423"/>
+          </a:xfrm>
+          <a:prstGeom prst="rect">
+            <a:avLst/>
+          </a:prstGeom>
+        </p:spPr>
+      </p:pic>
+      <p:cxnSp>
+        <p:nvCxnSpPr>
+          <p:cNvPr id="15" name="Conector: angular 14">
+            <a:extLst>
+              <a:ext uri="{FF2B5EF4-FFF2-40B4-BE49-F238E27FC236}">
+                <a16:creationId xmlns:a16="http://schemas.microsoft.com/office/drawing/2014/main" id="{1AAC07A6-E27A-FA8A-35D2-5F8067876CF9}"/>
+              </a:ext>
+            </a:extLst>
+          </p:cNvPr>
+          <p:cNvCxnSpPr>
+            <a:stCxn id="3" idx="3"/>
+            <a:endCxn id="5" idx="0"/>
+          </p:cNvCxnSpPr>
+          <p:nvPr/>
+        </p:nvCxnSpPr>
+        <p:spPr>
+          <a:xfrm>
+            <a:off x="839545" y="114316"/>
+            <a:ext cx="485843" cy="183454"/>
+          </a:xfrm>
+          <a:prstGeom prst="bentConnector2">
+            <a:avLst/>
+          </a:prstGeom>
+          <a:ln>
+            <a:solidFill>
+              <a:schemeClr val="tx1"/>
+            </a:solidFill>
+            <a:tailEnd type="triangle"/>
+          </a:ln>
+        </p:spPr>
+        <p:style>
+          <a:lnRef idx="1">
+            <a:schemeClr val="accent1"/>
+          </a:lnRef>
+          <a:fillRef idx="0">
+            <a:schemeClr val="accent1"/>
+          </a:fillRef>
+          <a:effectRef idx="0">
+            <a:schemeClr val="accent1"/>
+          </a:effectRef>
+          <a:fontRef idx="minor">
+            <a:schemeClr val="tx1"/>
+          </a:fontRef>
+        </p:style>
+      </p:cxnSp>
+      <p:cxnSp>
+        <p:nvCxnSpPr>
+          <p:cNvPr id="20" name="Conector recto 19">
+            <a:extLst>
+              <a:ext uri="{FF2B5EF4-FFF2-40B4-BE49-F238E27FC236}">
+                <a16:creationId xmlns:a16="http://schemas.microsoft.com/office/drawing/2014/main" id="{C4885A18-2FC4-E1D2-874B-FC64E5591EC2}"/>
+              </a:ext>
+            </a:extLst>
+          </p:cNvPr>
+          <p:cNvCxnSpPr>
+            <a:cxnSpLocks/>
+          </p:cNvCxnSpPr>
+          <p:nvPr/>
+        </p:nvCxnSpPr>
+        <p:spPr>
+          <a:xfrm>
+            <a:off x="1535006" y="428625"/>
+            <a:ext cx="552450" cy="0"/>
+          </a:xfrm>
+          <a:prstGeom prst="line">
+            <a:avLst/>
+          </a:prstGeom>
+          <a:ln>
+            <a:solidFill>
+              <a:schemeClr val="tx1"/>
+            </a:solidFill>
+          </a:ln>
+        </p:spPr>
+        <p:style>
+          <a:lnRef idx="1">
+            <a:schemeClr val="accent1"/>
+          </a:lnRef>
+          <a:fillRef idx="0">
+            <a:schemeClr val="accent1"/>
+          </a:fillRef>
+          <a:effectRef idx="0">
+            <a:schemeClr val="accent1"/>
+          </a:effectRef>
+          <a:fontRef idx="minor">
+            <a:schemeClr val="tx1"/>
+          </a:fontRef>
+        </p:style>
+      </p:cxnSp>
+      <p:cxnSp>
+        <p:nvCxnSpPr>
+          <p:cNvPr id="23" name="Conector recto de flecha 22">
+            <a:extLst>
+              <a:ext uri="{FF2B5EF4-FFF2-40B4-BE49-F238E27FC236}">
+                <a16:creationId xmlns:a16="http://schemas.microsoft.com/office/drawing/2014/main" id="{37820FE6-61DC-3A97-EC50-BF913E2D5A4C}"/>
+              </a:ext>
+            </a:extLst>
+          </p:cNvPr>
+          <p:cNvCxnSpPr>
+            <a:cxnSpLocks/>
+          </p:cNvCxnSpPr>
+          <p:nvPr/>
+        </p:nvCxnSpPr>
+        <p:spPr>
+          <a:xfrm>
+            <a:off x="2087456" y="428625"/>
+            <a:ext cx="0" cy="1323262"/>
+          </a:xfrm>
+          <a:prstGeom prst="straightConnector1">
+            <a:avLst/>
+          </a:prstGeom>
+          <a:ln>
+            <a:solidFill>
+              <a:schemeClr val="tx1"/>
+            </a:solidFill>
+            <a:tailEnd type="triangle"/>
+          </a:ln>
+        </p:spPr>
+        <p:style>
+          <a:lnRef idx="1">
+            <a:schemeClr val="accent1"/>
+          </a:lnRef>
+          <a:fillRef idx="0">
+            <a:schemeClr val="accent1"/>
+          </a:fillRef>
+          <a:effectRef idx="0">
+            <a:schemeClr val="accent1"/>
+          </a:effectRef>
+          <a:fontRef idx="minor">
+            <a:schemeClr val="tx1"/>
+          </a:fontRef>
+        </p:style>
+      </p:cxnSp>
+      <p:cxnSp>
+        <p:nvCxnSpPr>
+          <p:cNvPr id="25" name="Conector recto 24">
+            <a:extLst>
+              <a:ext uri="{FF2B5EF4-FFF2-40B4-BE49-F238E27FC236}">
+                <a16:creationId xmlns:a16="http://schemas.microsoft.com/office/drawing/2014/main" id="{5AA44480-CFD9-A75F-8B1F-4B806FD0BEC0}"/>
+              </a:ext>
+            </a:extLst>
+          </p:cNvPr>
+          <p:cNvCxnSpPr>
+            <a:cxnSpLocks/>
+          </p:cNvCxnSpPr>
+          <p:nvPr/>
+        </p:nvCxnSpPr>
+        <p:spPr>
+          <a:xfrm>
+            <a:off x="1593637" y="704850"/>
+            <a:ext cx="1882988" cy="0"/>
+          </a:xfrm>
+          <a:prstGeom prst="line">
+            <a:avLst/>
+          </a:prstGeom>
+          <a:ln>
+            <a:solidFill>
+              <a:schemeClr val="tx1"/>
+            </a:solidFill>
+          </a:ln>
+        </p:spPr>
+        <p:style>
+          <a:lnRef idx="1">
+            <a:schemeClr val="accent1"/>
+          </a:lnRef>
+          <a:fillRef idx="0">
+            <a:schemeClr val="accent1"/>
+          </a:fillRef>
+          <a:effectRef idx="0">
+            <a:schemeClr val="accent1"/>
+          </a:effectRef>
+          <a:fontRef idx="minor">
+            <a:schemeClr val="tx1"/>
+          </a:fontRef>
+        </p:style>
+      </p:cxnSp>
+      <p:cxnSp>
+        <p:nvCxnSpPr>
+          <p:cNvPr id="27" name="Conector recto de flecha 26">
+            <a:extLst>
+              <a:ext uri="{FF2B5EF4-FFF2-40B4-BE49-F238E27FC236}">
+                <a16:creationId xmlns:a16="http://schemas.microsoft.com/office/drawing/2014/main" id="{D113F814-6024-7060-E719-DE4AC19A8F69}"/>
+              </a:ext>
+            </a:extLst>
+          </p:cNvPr>
+          <p:cNvCxnSpPr>
+            <a:cxnSpLocks/>
+          </p:cNvCxnSpPr>
+          <p:nvPr/>
+        </p:nvCxnSpPr>
+        <p:spPr>
+          <a:xfrm>
+            <a:off x="3476625" y="704850"/>
+            <a:ext cx="0" cy="1047037"/>
+          </a:xfrm>
+          <a:prstGeom prst="straightConnector1">
+            <a:avLst/>
+          </a:prstGeom>
+          <a:ln>
+            <a:solidFill>
+              <a:schemeClr val="tx1"/>
+            </a:solidFill>
+            <a:tailEnd type="triangle"/>
+          </a:ln>
+        </p:spPr>
+        <p:style>
+          <a:lnRef idx="1">
+            <a:schemeClr val="accent1"/>
+          </a:lnRef>
+          <a:fillRef idx="0">
+            <a:schemeClr val="accent1"/>
+          </a:fillRef>
+          <a:effectRef idx="0">
+            <a:schemeClr val="accent1"/>
+          </a:effectRef>
+          <a:fontRef idx="minor">
+            <a:schemeClr val="tx1"/>
+          </a:fontRef>
+        </p:style>
+      </p:cxnSp>
+      <p:cxnSp>
+        <p:nvCxnSpPr>
+          <p:cNvPr id="29" name="Conector recto 28">
+            <a:extLst>
+              <a:ext uri="{FF2B5EF4-FFF2-40B4-BE49-F238E27FC236}">
+                <a16:creationId xmlns:a16="http://schemas.microsoft.com/office/drawing/2014/main" id="{6A367CDC-AD48-0F50-2CFF-ABBAF5E9E0FE}"/>
+              </a:ext>
+            </a:extLst>
+          </p:cNvPr>
+          <p:cNvCxnSpPr>
+            <a:cxnSpLocks/>
+          </p:cNvCxnSpPr>
+          <p:nvPr/>
+        </p:nvCxnSpPr>
+        <p:spPr>
+          <a:xfrm>
+            <a:off x="3611456" y="3248025"/>
+            <a:ext cx="1141785" cy="0"/>
+          </a:xfrm>
+          <a:prstGeom prst="line">
+            <a:avLst/>
+          </a:prstGeom>
+          <a:ln>
+            <a:solidFill>
+              <a:schemeClr val="tx1"/>
+            </a:solidFill>
+            <a:headEnd type="none" w="med" len="med"/>
+            <a:tailEnd type="triangle" w="med" len="med"/>
+          </a:ln>
+        </p:spPr>
+        <p:style>
+          <a:lnRef idx="1">
+            <a:schemeClr val="accent1"/>
+          </a:lnRef>
+          <a:fillRef idx="0">
+            <a:schemeClr val="accent1"/>
+          </a:fillRef>
+          <a:effectRef idx="0">
+            <a:schemeClr val="accent1"/>
+          </a:effectRef>
+          <a:fontRef idx="minor">
+            <a:schemeClr val="tx1"/>
+          </a:fontRef>
+        </p:style>
+      </p:cxnSp>
+      <p:cxnSp>
+        <p:nvCxnSpPr>
+          <p:cNvPr id="31" name="Conector recto 30">
+            <a:extLst>
+              <a:ext uri="{FF2B5EF4-FFF2-40B4-BE49-F238E27FC236}">
+                <a16:creationId xmlns:a16="http://schemas.microsoft.com/office/drawing/2014/main" id="{2888C1CA-2736-6D3A-7675-320EB2219185}"/>
+              </a:ext>
+            </a:extLst>
+          </p:cNvPr>
+          <p:cNvCxnSpPr>
+            <a:cxnSpLocks/>
+          </p:cNvCxnSpPr>
+          <p:nvPr/>
+        </p:nvCxnSpPr>
+        <p:spPr>
+          <a:xfrm>
+            <a:off x="5525107" y="3248025"/>
+            <a:ext cx="847610" cy="0"/>
+          </a:xfrm>
+          <a:prstGeom prst="line">
+            <a:avLst/>
+          </a:prstGeom>
+          <a:ln>
+            <a:solidFill>
+              <a:schemeClr val="tx1"/>
+            </a:solidFill>
+            <a:headEnd type="none" w="med" len="med"/>
+            <a:tailEnd type="triangle" w="med" len="med"/>
+          </a:ln>
+        </p:spPr>
+        <p:style>
+          <a:lnRef idx="1">
+            <a:schemeClr val="accent1"/>
+          </a:lnRef>
+          <a:fillRef idx="0">
+            <a:schemeClr val="accent1"/>
+          </a:fillRef>
+          <a:effectRef idx="0">
+            <a:schemeClr val="accent1"/>
+          </a:effectRef>
+          <a:fontRef idx="minor">
+            <a:schemeClr val="tx1"/>
+          </a:fontRef>
+        </p:style>
+      </p:cxnSp>
     </p:spTree>
     <p:extLst>
       <p:ext uri="{BB962C8B-B14F-4D97-AF65-F5344CB8AC3E}">
@@ -5649,6 +6403,77 @@
           <a:chExt cx="0" cy="0"/>
         </a:xfrm>
       </p:grpSpPr>
+      <p:sp>
+        <p:nvSpPr>
+          <p:cNvPr id="2" name="CuadroTexto 1">
+            <a:extLst>
+              <a:ext uri="{FF2B5EF4-FFF2-40B4-BE49-F238E27FC236}">
+                <a16:creationId xmlns:a16="http://schemas.microsoft.com/office/drawing/2014/main" id="{0CECA3E6-C4D6-FA5F-86C5-9E6222A61D75}"/>
+              </a:ext>
+            </a:extLst>
+          </p:cNvPr>
+          <p:cNvSpPr txBox="1"/>
+          <p:nvPr/>
+        </p:nvSpPr>
+        <p:spPr>
+          <a:xfrm>
+            <a:off x="238125" y="333375"/>
+            <a:ext cx="7362825" cy="923330"/>
+          </a:xfrm>
+          <a:prstGeom prst="rect">
+            <a:avLst/>
+          </a:prstGeom>
+          <a:noFill/>
+        </p:spPr>
+        <p:txBody>
+          <a:bodyPr wrap="square" rtlCol="0">
+            <a:spAutoFit/>
+          </a:bodyPr>
+          <a:lstStyle/>
+          <a:p>
+            <a:r>
+              <a:rPr lang="es-MX" dirty="0"/>
+              <a:t>Mi perrita PUG llamada Lanita es viejita y quiere ser un angelito</a:t>
+            </a:r>
+          </a:p>
+          <a:p>
+            <a:endParaRPr lang="es-MX" dirty="0"/>
+          </a:p>
+          <a:p>
+            <a:endParaRPr lang="es-MX" dirty="0"/>
+          </a:p>
+        </p:txBody>
+      </p:sp>
+      <p:pic>
+        <p:nvPicPr>
+          <p:cNvPr id="4" name="Imagen 3">
+            <a:extLst>
+              <a:ext uri="{FF2B5EF4-FFF2-40B4-BE49-F238E27FC236}">
+                <a16:creationId xmlns:a16="http://schemas.microsoft.com/office/drawing/2014/main" id="{B515575B-6519-D4FA-31FB-A625D14657DC}"/>
+              </a:ext>
+            </a:extLst>
+          </p:cNvPr>
+          <p:cNvPicPr>
+            <a:picLocks noChangeAspect="1"/>
+          </p:cNvPicPr>
+          <p:nvPr/>
+        </p:nvPicPr>
+        <p:blipFill>
+          <a:blip r:embed="rId2"/>
+          <a:stretch>
+            <a:fillRect/>
+          </a:stretch>
+        </p:blipFill>
+        <p:spPr>
+          <a:xfrm>
+            <a:off x="406741" y="979660"/>
+            <a:ext cx="7025591" cy="5306840"/>
+          </a:xfrm>
+          <a:prstGeom prst="rect">
+            <a:avLst/>
+          </a:prstGeom>
+        </p:spPr>
+      </p:pic>
     </p:spTree>
     <p:extLst>
       <p:ext uri="{BB962C8B-B14F-4D97-AF65-F5344CB8AC3E}">

</xml_diff>

<commit_message>
Updated code hasta nuevos colores y creacion de pdf
</commit_message>
<xml_diff>
--- a/Others/Aiventura MFC.pptx
+++ b/Others/Aiventura MFC.pptx
@@ -3455,6 +3455,77 @@
           <a:chExt cx="0" cy="0"/>
         </a:xfrm>
       </p:grpSpPr>
+      <p:sp>
+        <p:nvSpPr>
+          <p:cNvPr id="3" name="CuadroTexto 2">
+            <a:extLst>
+              <a:ext uri="{FF2B5EF4-FFF2-40B4-BE49-F238E27FC236}">
+                <a16:creationId xmlns:a16="http://schemas.microsoft.com/office/drawing/2014/main" id="{A35FF5A3-9DE4-3141-7872-41EC04D0AEFE}"/>
+              </a:ext>
+            </a:extLst>
+          </p:cNvPr>
+          <p:cNvSpPr txBox="1"/>
+          <p:nvPr/>
+        </p:nvSpPr>
+        <p:spPr>
+          <a:xfrm>
+            <a:off x="242276" y="114497"/>
+            <a:ext cx="9534770" cy="369332"/>
+          </a:xfrm>
+          <a:prstGeom prst="rect">
+            <a:avLst/>
+          </a:prstGeom>
+          <a:noFill/>
+        </p:spPr>
+        <p:txBody>
+          <a:bodyPr wrap="square">
+            <a:spAutoFit/>
+          </a:bodyPr>
+          <a:lstStyle/>
+          <a:p>
+            <a:r>
+              <a:rPr lang="es-MX" dirty="0" err="1"/>
+              <a:t>ndk.dir</a:t>
+            </a:r>
+            <a:r>
+              <a:rPr lang="es-MX" dirty="0"/>
+              <a:t>=C:\\</a:t>
+            </a:r>
+            <a:r>
+              <a:rPr lang="es-MX" dirty="0" err="1"/>
+              <a:t>Users</a:t>
+            </a:r>
+            <a:r>
+              <a:rPr lang="es-MX" dirty="0"/>
+              <a:t>\\HP\\</a:t>
+            </a:r>
+            <a:r>
+              <a:rPr lang="es-MX" dirty="0" err="1"/>
+              <a:t>AppData</a:t>
+            </a:r>
+            <a:r>
+              <a:rPr lang="es-MX" dirty="0"/>
+              <a:t>\\Local\\Android\\</a:t>
+            </a:r>
+            <a:r>
+              <a:rPr lang="es-MX" dirty="0" err="1"/>
+              <a:t>Sdk</a:t>
+            </a:r>
+            <a:r>
+              <a:rPr lang="es-MX" dirty="0"/>
+              <a:t>\\</a:t>
+            </a:r>
+            <a:r>
+              <a:rPr lang="es-MX" dirty="0" err="1"/>
+              <a:t>ndk</a:t>
+            </a:r>
+            <a:r>
+              <a:rPr lang="es-MX" dirty="0"/>
+              <a:t>\\29.0.13113456</a:t>
+            </a:r>
+          </a:p>
+        </p:txBody>
+      </p:sp>
     </p:spTree>
     <p:extLst>
       <p:ext uri="{BB962C8B-B14F-4D97-AF65-F5344CB8AC3E}">
@@ -4333,15 +4404,7 @@
             </a:r>
             <a:r>
               <a:rPr lang="es-MX" dirty="0"/>
-              <a:t>/HP/Desktop/MFC/</a:t>
-            </a:r>
-            <a:r>
-              <a:rPr lang="es-MX" dirty="0" err="1"/>
-              <a:t>Aiventura</a:t>
-            </a:r>
-            <a:r>
-              <a:rPr lang="es-MX" dirty="0"/>
-              <a:t>/</a:t>
+              <a:t>/HP/Desktop/MFC/Aiventura/</a:t>
             </a:r>
             <a:r>
               <a:rPr lang="es-MX" dirty="0" err="1"/>
@@ -5435,15 +5498,7 @@
           <a:p>
             <a:r>
               <a:rPr lang="es-MX" dirty="0"/>
-              <a:t>cd ~/Desktop/MFC/</a:t>
-            </a:r>
-            <a:r>
-              <a:rPr lang="es-MX" dirty="0" err="1"/>
-              <a:t>Aiventura</a:t>
-            </a:r>
-            <a:r>
-              <a:rPr lang="es-MX" dirty="0"/>
-              <a:t>/</a:t>
+              <a:t>cd ~/Desktop/MFC/Aiventura/</a:t>
             </a:r>
             <a:r>
               <a:rPr lang="es-MX" dirty="0" err="1"/>
@@ -5503,15 +5558,7 @@
           <a:p>
             <a:r>
               <a:rPr lang="es-MX" dirty="0"/>
-              <a:t>cd ~/Desktop/MFC/</a:t>
-            </a:r>
-            <a:r>
-              <a:rPr lang="es-MX" dirty="0" err="1"/>
-              <a:t>Aiventura</a:t>
-            </a:r>
-            <a:r>
-              <a:rPr lang="es-MX" dirty="0"/>
-              <a:t>/</a:t>
+              <a:t>cd ~/Desktop/MFC/Aiventura/</a:t>
             </a:r>
             <a:r>
               <a:rPr lang="es-MX" dirty="0" err="1"/>
@@ -5731,12 +5778,8 @@
               <a:t>ok guarda este chat como referencia como </a:t>
             </a:r>
             <a:r>
-              <a:rPr lang="es-MX" b="1" dirty="0" err="1"/>
-              <a:t>Aiventura</a:t>
-            </a:r>
-            <a:r>
               <a:rPr lang="es-MX" b="1" dirty="0"/>
-              <a:t> antes de PDF</a:t>
+              <a:t>Aiventura antes de PDF</a:t>
             </a:r>
           </a:p>
           <a:p>
@@ -6510,6 +6553,136 @@
           <a:chExt cx="0" cy="0"/>
         </a:xfrm>
       </p:grpSpPr>
+      <p:pic>
+        <p:nvPicPr>
+          <p:cNvPr id="3" name="Imagen 2">
+            <a:extLst>
+              <a:ext uri="{FF2B5EF4-FFF2-40B4-BE49-F238E27FC236}">
+                <a16:creationId xmlns:a16="http://schemas.microsoft.com/office/drawing/2014/main" id="{D034C79B-399C-3AB0-7717-C8E4613664C7}"/>
+              </a:ext>
+            </a:extLst>
+          </p:cNvPr>
+          <p:cNvPicPr>
+            <a:picLocks noChangeAspect="1"/>
+          </p:cNvPicPr>
+          <p:nvPr/>
+        </p:nvPicPr>
+        <p:blipFill>
+          <a:blip r:embed="rId2"/>
+          <a:stretch>
+            <a:fillRect/>
+          </a:stretch>
+        </p:blipFill>
+        <p:spPr>
+          <a:xfrm>
+            <a:off x="499899" y="647405"/>
+            <a:ext cx="3085384" cy="5591470"/>
+          </a:xfrm>
+          <a:prstGeom prst="rect">
+            <a:avLst/>
+          </a:prstGeom>
+        </p:spPr>
+      </p:pic>
+      <p:pic>
+        <p:nvPicPr>
+          <p:cNvPr id="5" name="Imagen 4">
+            <a:extLst>
+              <a:ext uri="{FF2B5EF4-FFF2-40B4-BE49-F238E27FC236}">
+                <a16:creationId xmlns:a16="http://schemas.microsoft.com/office/drawing/2014/main" id="{A2317ACF-9FD2-77A5-1D68-FCE55E7923D2}"/>
+              </a:ext>
+            </a:extLst>
+          </p:cNvPr>
+          <p:cNvPicPr>
+            <a:picLocks noChangeAspect="1"/>
+          </p:cNvPicPr>
+          <p:nvPr/>
+        </p:nvPicPr>
+        <p:blipFill>
+          <a:blip r:embed="rId3"/>
+          <a:stretch>
+            <a:fillRect/>
+          </a:stretch>
+        </p:blipFill>
+        <p:spPr>
+          <a:xfrm>
+            <a:off x="499899" y="647405"/>
+            <a:ext cx="3085384" cy="5591470"/>
+          </a:xfrm>
+          <a:prstGeom prst="rect">
+            <a:avLst/>
+          </a:prstGeom>
+        </p:spPr>
+      </p:pic>
+      <p:sp>
+        <p:nvSpPr>
+          <p:cNvPr id="6" name="CuadroTexto 5">
+            <a:extLst>
+              <a:ext uri="{FF2B5EF4-FFF2-40B4-BE49-F238E27FC236}">
+                <a16:creationId xmlns:a16="http://schemas.microsoft.com/office/drawing/2014/main" id="{E415E555-1967-17D5-5B1F-58F146D49FD4}"/>
+              </a:ext>
+            </a:extLst>
+          </p:cNvPr>
+          <p:cNvSpPr txBox="1"/>
+          <p:nvPr/>
+        </p:nvSpPr>
+        <p:spPr>
+          <a:xfrm>
+            <a:off x="499899" y="514350"/>
+            <a:ext cx="3085384" cy="584775"/>
+          </a:xfrm>
+          <a:prstGeom prst="rect">
+            <a:avLst/>
+          </a:prstGeom>
+          <a:noFill/>
+        </p:spPr>
+        <p:txBody>
+          <a:bodyPr wrap="square" rtlCol="0">
+            <a:spAutoFit/>
+          </a:bodyPr>
+          <a:lstStyle/>
+          <a:p>
+            <a:pPr algn="ctr"/>
+            <a:r>
+              <a:rPr lang="es-MX" sz="3200" b="1" dirty="0">
+                <a:solidFill>
+                  <a:schemeClr val="bg1"/>
+                </a:solidFill>
+              </a:rPr>
+              <a:t>Aiventura</a:t>
+            </a:r>
+          </a:p>
+        </p:txBody>
+      </p:sp>
+      <p:pic>
+        <p:nvPicPr>
+          <p:cNvPr id="8" name="Imagen 7">
+            <a:extLst>
+              <a:ext uri="{FF2B5EF4-FFF2-40B4-BE49-F238E27FC236}">
+                <a16:creationId xmlns:a16="http://schemas.microsoft.com/office/drawing/2014/main" id="{E18F14E7-A77B-2C7F-4860-8A055CC8767F}"/>
+              </a:ext>
+            </a:extLst>
+          </p:cNvPr>
+          <p:cNvPicPr>
+            <a:picLocks noChangeAspect="1"/>
+          </p:cNvPicPr>
+          <p:nvPr/>
+        </p:nvPicPr>
+        <p:blipFill>
+          <a:blip r:embed="rId4"/>
+          <a:stretch>
+            <a:fillRect/>
+          </a:stretch>
+        </p:blipFill>
+        <p:spPr>
+          <a:xfrm>
+            <a:off x="4426260" y="0"/>
+            <a:ext cx="3339480" cy="6858000"/>
+          </a:xfrm>
+          <a:prstGeom prst="rect">
+            <a:avLst/>
+          </a:prstGeom>
+        </p:spPr>
+      </p:pic>
     </p:spTree>
     <p:extLst>
       <p:ext uri="{BB962C8B-B14F-4D97-AF65-F5344CB8AC3E}">

</xml_diff>